<commit_message>
Updating FDO Client SDK docs
- Update content and diagrams in FDO Client SDK  documents.

Signed-off-by: Chandrakar, Prateek <prateek.chandrakar@intel.com>
</commit_message>
<xml_diff>
--- a/resources/image-sources/Client SDK FIDOIOT Figures.pptx
+++ b/resources/image-sources/Client SDK FIDOIOT Figures.pptx
@@ -12,6 +12,9 @@
     <p:sldId id="259" r:id="rId9"/>
     <p:sldId id="260" r:id="rId10"/>
     <p:sldId id="262" r:id="rId11"/>
+    <p:sldId id="263" r:id="rId12"/>
+    <p:sldId id="264" r:id="rId13"/>
+    <p:sldId id="265" r:id="rId14"/>
   </p:sldIdLst>
   <p:sldSz cx="12192000" cy="6858000"/>
   <p:notesSz cx="6858000" cy="9144000"/>
@@ -128,6 +131,116 @@
 
 <file path=ppt/changesInfos/changesInfo1.xml><?xml version="1.0" encoding="utf-8"?>
 <pc:chgInfo xmlns:a="http://schemas.openxmlformats.org/drawingml/2006/main" xmlns:r="http://schemas.openxmlformats.org/officeDocument/2006/relationships" xmlns:ac="http://schemas.microsoft.com/office/drawing/2013/main/command" xmlns:pc="http://schemas.microsoft.com/office/powerpoint/2013/main/command">
+  <pc:docChgLst>
+    <pc:chgData name="Barnes, Thomas J" userId="37480386-2bb4-40b2-9bcc-723ca760ccb2" providerId="ADAL" clId="{0ED6C77C-EEE1-4E91-AA28-BBB4F5726752}"/>
+    <pc:docChg chg="modSld">
+      <pc:chgData name="Barnes, Thomas J" userId="37480386-2bb4-40b2-9bcc-723ca760ccb2" providerId="ADAL" clId="{0ED6C77C-EEE1-4E91-AA28-BBB4F5726752}" dt="2020-12-11T22:25:55.607" v="115"/>
+      <pc:docMkLst>
+        <pc:docMk/>
+      </pc:docMkLst>
+      <pc:sldChg chg="modSp">
+        <pc:chgData name="Barnes, Thomas J" userId="37480386-2bb4-40b2-9bcc-723ca760ccb2" providerId="ADAL" clId="{0ED6C77C-EEE1-4E91-AA28-BBB4F5726752}" dt="2020-12-11T22:23:38.768" v="11" actId="20577"/>
+        <pc:sldMkLst>
+          <pc:docMk/>
+          <pc:sldMk cId="1304774395" sldId="256"/>
+        </pc:sldMkLst>
+        <pc:spChg chg="mod">
+          <ac:chgData name="Barnes, Thomas J" userId="37480386-2bb4-40b2-9bcc-723ca760ccb2" providerId="ADAL" clId="{0ED6C77C-EEE1-4E91-AA28-BBB4F5726752}" dt="2020-12-11T22:23:32.759" v="3" actId="20577"/>
+          <ac:spMkLst>
+            <pc:docMk/>
+            <pc:sldMk cId="1304774395" sldId="256"/>
+            <ac:spMk id="2" creationId="{6486B4D3-7E15-4F73-8C27-C74D3FAB24CA}"/>
+          </ac:spMkLst>
+        </pc:spChg>
+        <pc:spChg chg="mod">
+          <ac:chgData name="Barnes, Thomas J" userId="37480386-2bb4-40b2-9bcc-723ca760ccb2" providerId="ADAL" clId="{0ED6C77C-EEE1-4E91-AA28-BBB4F5726752}" dt="2020-12-11T22:23:38.768" v="11" actId="20577"/>
+          <ac:spMkLst>
+            <pc:docMk/>
+            <pc:sldMk cId="1304774395" sldId="256"/>
+            <ac:spMk id="3" creationId="{79BBA8C9-B9BB-4EF4-B2F8-66EC48BE8E6E}"/>
+          </ac:spMkLst>
+        </pc:spChg>
+      </pc:sldChg>
+      <pc:sldChg chg="addSp modSp">
+        <pc:chgData name="Barnes, Thomas J" userId="37480386-2bb4-40b2-9bcc-723ca760ccb2" providerId="ADAL" clId="{0ED6C77C-EEE1-4E91-AA28-BBB4F5726752}" dt="2020-12-11T22:25:19.208" v="111" actId="20577"/>
+        <pc:sldMkLst>
+          <pc:docMk/>
+          <pc:sldMk cId="948198937" sldId="259"/>
+        </pc:sldMkLst>
+        <pc:spChg chg="add mod">
+          <ac:chgData name="Barnes, Thomas J" userId="37480386-2bb4-40b2-9bcc-723ca760ccb2" providerId="ADAL" clId="{0ED6C77C-EEE1-4E91-AA28-BBB4F5726752}" dt="2020-12-11T22:24:48.809" v="38" actId="1038"/>
+          <ac:spMkLst>
+            <pc:docMk/>
+            <pc:sldMk cId="948198937" sldId="259"/>
+            <ac:spMk id="11" creationId="{EB207ED8-702D-434B-81D2-3DD4A4202B8A}"/>
+          </ac:spMkLst>
+        </pc:spChg>
+        <pc:spChg chg="add mod">
+          <ac:chgData name="Barnes, Thomas J" userId="37480386-2bb4-40b2-9bcc-723ca760ccb2" providerId="ADAL" clId="{0ED6C77C-EEE1-4E91-AA28-BBB4F5726752}" dt="2020-12-11T22:24:44.616" v="33" actId="1036"/>
+          <ac:spMkLst>
+            <pc:docMk/>
+            <pc:sldMk cId="948198937" sldId="259"/>
+            <ac:spMk id="22" creationId="{8EAEAA98-3240-4230-8548-07B3160F1F4B}"/>
+          </ac:spMkLst>
+        </pc:spChg>
+        <pc:spChg chg="add mod">
+          <ac:chgData name="Barnes, Thomas J" userId="37480386-2bb4-40b2-9bcc-723ca760ccb2" providerId="ADAL" clId="{0ED6C77C-EEE1-4E91-AA28-BBB4F5726752}" dt="2020-12-11T22:25:14.881" v="108" actId="20577"/>
+          <ac:spMkLst>
+            <pc:docMk/>
+            <pc:sldMk cId="948198937" sldId="259"/>
+            <ac:spMk id="24" creationId="{D4F220C4-48CA-4F79-B429-94647A570F88}"/>
+          </ac:spMkLst>
+        </pc:spChg>
+        <pc:spChg chg="add mod">
+          <ac:chgData name="Barnes, Thomas J" userId="37480386-2bb4-40b2-9bcc-723ca760ccb2" providerId="ADAL" clId="{0ED6C77C-EEE1-4E91-AA28-BBB4F5726752}" dt="2020-12-11T22:25:19.208" v="111" actId="20577"/>
+          <ac:spMkLst>
+            <pc:docMk/>
+            <pc:sldMk cId="948198937" sldId="259"/>
+            <ac:spMk id="25" creationId="{4EAC8FC1-CF39-4A47-B97A-14F38E896D11}"/>
+          </ac:spMkLst>
+        </pc:spChg>
+      </pc:sldChg>
+      <pc:sldChg chg="addSp modSp">
+        <pc:chgData name="Barnes, Thomas J" userId="37480386-2bb4-40b2-9bcc-723ca760ccb2" providerId="ADAL" clId="{0ED6C77C-EEE1-4E91-AA28-BBB4F5726752}" dt="2020-12-11T22:25:55.607" v="115"/>
+        <pc:sldMkLst>
+          <pc:docMk/>
+          <pc:sldMk cId="3044289826" sldId="260"/>
+        </pc:sldMkLst>
+        <pc:spChg chg="add mod">
+          <ac:chgData name="Barnes, Thomas J" userId="37480386-2bb4-40b2-9bcc-723ca760ccb2" providerId="ADAL" clId="{0ED6C77C-EEE1-4E91-AA28-BBB4F5726752}" dt="2020-12-11T22:25:31.808" v="114" actId="1037"/>
+          <ac:spMkLst>
+            <pc:docMk/>
+            <pc:sldMk cId="3044289826" sldId="260"/>
+            <ac:spMk id="21" creationId="{D9ECB586-FE4B-4110-9404-DFBD864C154C}"/>
+          </ac:spMkLst>
+        </pc:spChg>
+        <pc:spChg chg="add mod">
+          <ac:chgData name="Barnes, Thomas J" userId="37480386-2bb4-40b2-9bcc-723ca760ccb2" providerId="ADAL" clId="{0ED6C77C-EEE1-4E91-AA28-BBB4F5726752}" dt="2020-12-11T22:25:31.808" v="114" actId="1037"/>
+          <ac:spMkLst>
+            <pc:docMk/>
+            <pc:sldMk cId="3044289826" sldId="260"/>
+            <ac:spMk id="22" creationId="{1ED1F05A-A955-4643-B071-FF1A5554ED2F}"/>
+          </ac:spMkLst>
+        </pc:spChg>
+        <pc:spChg chg="add">
+          <ac:chgData name="Barnes, Thomas J" userId="37480386-2bb4-40b2-9bcc-723ca760ccb2" providerId="ADAL" clId="{0ED6C77C-EEE1-4E91-AA28-BBB4F5726752}" dt="2020-12-11T22:25:55.607" v="115"/>
+          <ac:spMkLst>
+            <pc:docMk/>
+            <pc:sldMk cId="3044289826" sldId="260"/>
+            <ac:spMk id="24" creationId="{0EF3237C-E998-4118-A7E3-FCB7F5F23449}"/>
+          </ac:spMkLst>
+        </pc:spChg>
+        <pc:spChg chg="add">
+          <ac:chgData name="Barnes, Thomas J" userId="37480386-2bb4-40b2-9bcc-723ca760ccb2" providerId="ADAL" clId="{0ED6C77C-EEE1-4E91-AA28-BBB4F5726752}" dt="2020-12-11T22:25:55.607" v="115"/>
+          <ac:spMkLst>
+            <pc:docMk/>
+            <pc:sldMk cId="3044289826" sldId="260"/>
+            <ac:spMk id="25" creationId="{0037DEBE-667F-4E79-A14B-E9D3DD77BCE3}"/>
+          </ac:spMkLst>
+        </pc:spChg>
+      </pc:sldChg>
+    </pc:docChg>
+  </pc:docChgLst>
   <pc:docChgLst>
     <pc:chgData name="Barnes, Thomas J" userId="37480386-2bb4-40b2-9bcc-723ca760ccb2" providerId="ADAL" clId="{6EA7A360-075B-4FAA-B184-F653D53EB23D}"/>
     <pc:docChg chg="undo custSel addSld modSld sldOrd">
@@ -343,116 +456,6 @@
       </pc:sldChg>
     </pc:docChg>
   </pc:docChgLst>
-  <pc:docChgLst>
-    <pc:chgData name="Barnes, Thomas J" userId="37480386-2bb4-40b2-9bcc-723ca760ccb2" providerId="ADAL" clId="{0ED6C77C-EEE1-4E91-AA28-BBB4F5726752}"/>
-    <pc:docChg chg="modSld">
-      <pc:chgData name="Barnes, Thomas J" userId="37480386-2bb4-40b2-9bcc-723ca760ccb2" providerId="ADAL" clId="{0ED6C77C-EEE1-4E91-AA28-BBB4F5726752}" dt="2020-12-11T22:25:55.607" v="115"/>
-      <pc:docMkLst>
-        <pc:docMk/>
-      </pc:docMkLst>
-      <pc:sldChg chg="modSp">
-        <pc:chgData name="Barnes, Thomas J" userId="37480386-2bb4-40b2-9bcc-723ca760ccb2" providerId="ADAL" clId="{0ED6C77C-EEE1-4E91-AA28-BBB4F5726752}" dt="2020-12-11T22:23:38.768" v="11" actId="20577"/>
-        <pc:sldMkLst>
-          <pc:docMk/>
-          <pc:sldMk cId="1304774395" sldId="256"/>
-        </pc:sldMkLst>
-        <pc:spChg chg="mod">
-          <ac:chgData name="Barnes, Thomas J" userId="37480386-2bb4-40b2-9bcc-723ca760ccb2" providerId="ADAL" clId="{0ED6C77C-EEE1-4E91-AA28-BBB4F5726752}" dt="2020-12-11T22:23:32.759" v="3" actId="20577"/>
-          <ac:spMkLst>
-            <pc:docMk/>
-            <pc:sldMk cId="1304774395" sldId="256"/>
-            <ac:spMk id="2" creationId="{6486B4D3-7E15-4F73-8C27-C74D3FAB24CA}"/>
-          </ac:spMkLst>
-        </pc:spChg>
-        <pc:spChg chg="mod">
-          <ac:chgData name="Barnes, Thomas J" userId="37480386-2bb4-40b2-9bcc-723ca760ccb2" providerId="ADAL" clId="{0ED6C77C-EEE1-4E91-AA28-BBB4F5726752}" dt="2020-12-11T22:23:38.768" v="11" actId="20577"/>
-          <ac:spMkLst>
-            <pc:docMk/>
-            <pc:sldMk cId="1304774395" sldId="256"/>
-            <ac:spMk id="3" creationId="{79BBA8C9-B9BB-4EF4-B2F8-66EC48BE8E6E}"/>
-          </ac:spMkLst>
-        </pc:spChg>
-      </pc:sldChg>
-      <pc:sldChg chg="addSp modSp">
-        <pc:chgData name="Barnes, Thomas J" userId="37480386-2bb4-40b2-9bcc-723ca760ccb2" providerId="ADAL" clId="{0ED6C77C-EEE1-4E91-AA28-BBB4F5726752}" dt="2020-12-11T22:25:19.208" v="111" actId="20577"/>
-        <pc:sldMkLst>
-          <pc:docMk/>
-          <pc:sldMk cId="948198937" sldId="259"/>
-        </pc:sldMkLst>
-        <pc:spChg chg="add mod">
-          <ac:chgData name="Barnes, Thomas J" userId="37480386-2bb4-40b2-9bcc-723ca760ccb2" providerId="ADAL" clId="{0ED6C77C-EEE1-4E91-AA28-BBB4F5726752}" dt="2020-12-11T22:24:48.809" v="38" actId="1038"/>
-          <ac:spMkLst>
-            <pc:docMk/>
-            <pc:sldMk cId="948198937" sldId="259"/>
-            <ac:spMk id="11" creationId="{EB207ED8-702D-434B-81D2-3DD4A4202B8A}"/>
-          </ac:spMkLst>
-        </pc:spChg>
-        <pc:spChg chg="add mod">
-          <ac:chgData name="Barnes, Thomas J" userId="37480386-2bb4-40b2-9bcc-723ca760ccb2" providerId="ADAL" clId="{0ED6C77C-EEE1-4E91-AA28-BBB4F5726752}" dt="2020-12-11T22:24:44.616" v="33" actId="1036"/>
-          <ac:spMkLst>
-            <pc:docMk/>
-            <pc:sldMk cId="948198937" sldId="259"/>
-            <ac:spMk id="22" creationId="{8EAEAA98-3240-4230-8548-07B3160F1F4B}"/>
-          </ac:spMkLst>
-        </pc:spChg>
-        <pc:spChg chg="add mod">
-          <ac:chgData name="Barnes, Thomas J" userId="37480386-2bb4-40b2-9bcc-723ca760ccb2" providerId="ADAL" clId="{0ED6C77C-EEE1-4E91-AA28-BBB4F5726752}" dt="2020-12-11T22:25:14.881" v="108" actId="20577"/>
-          <ac:spMkLst>
-            <pc:docMk/>
-            <pc:sldMk cId="948198937" sldId="259"/>
-            <ac:spMk id="24" creationId="{D4F220C4-48CA-4F79-B429-94647A570F88}"/>
-          </ac:spMkLst>
-        </pc:spChg>
-        <pc:spChg chg="add mod">
-          <ac:chgData name="Barnes, Thomas J" userId="37480386-2bb4-40b2-9bcc-723ca760ccb2" providerId="ADAL" clId="{0ED6C77C-EEE1-4E91-AA28-BBB4F5726752}" dt="2020-12-11T22:25:19.208" v="111" actId="20577"/>
-          <ac:spMkLst>
-            <pc:docMk/>
-            <pc:sldMk cId="948198937" sldId="259"/>
-            <ac:spMk id="25" creationId="{4EAC8FC1-CF39-4A47-B97A-14F38E896D11}"/>
-          </ac:spMkLst>
-        </pc:spChg>
-      </pc:sldChg>
-      <pc:sldChg chg="addSp modSp">
-        <pc:chgData name="Barnes, Thomas J" userId="37480386-2bb4-40b2-9bcc-723ca760ccb2" providerId="ADAL" clId="{0ED6C77C-EEE1-4E91-AA28-BBB4F5726752}" dt="2020-12-11T22:25:55.607" v="115"/>
-        <pc:sldMkLst>
-          <pc:docMk/>
-          <pc:sldMk cId="3044289826" sldId="260"/>
-        </pc:sldMkLst>
-        <pc:spChg chg="add mod">
-          <ac:chgData name="Barnes, Thomas J" userId="37480386-2bb4-40b2-9bcc-723ca760ccb2" providerId="ADAL" clId="{0ED6C77C-EEE1-4E91-AA28-BBB4F5726752}" dt="2020-12-11T22:25:31.808" v="114" actId="1037"/>
-          <ac:spMkLst>
-            <pc:docMk/>
-            <pc:sldMk cId="3044289826" sldId="260"/>
-            <ac:spMk id="21" creationId="{D9ECB586-FE4B-4110-9404-DFBD864C154C}"/>
-          </ac:spMkLst>
-        </pc:spChg>
-        <pc:spChg chg="add mod">
-          <ac:chgData name="Barnes, Thomas J" userId="37480386-2bb4-40b2-9bcc-723ca760ccb2" providerId="ADAL" clId="{0ED6C77C-EEE1-4E91-AA28-BBB4F5726752}" dt="2020-12-11T22:25:31.808" v="114" actId="1037"/>
-          <ac:spMkLst>
-            <pc:docMk/>
-            <pc:sldMk cId="3044289826" sldId="260"/>
-            <ac:spMk id="22" creationId="{1ED1F05A-A955-4643-B071-FF1A5554ED2F}"/>
-          </ac:spMkLst>
-        </pc:spChg>
-        <pc:spChg chg="add">
-          <ac:chgData name="Barnes, Thomas J" userId="37480386-2bb4-40b2-9bcc-723ca760ccb2" providerId="ADAL" clId="{0ED6C77C-EEE1-4E91-AA28-BBB4F5726752}" dt="2020-12-11T22:25:55.607" v="115"/>
-          <ac:spMkLst>
-            <pc:docMk/>
-            <pc:sldMk cId="3044289826" sldId="260"/>
-            <ac:spMk id="24" creationId="{0EF3237C-E998-4118-A7E3-FCB7F5F23449}"/>
-          </ac:spMkLst>
-        </pc:spChg>
-        <pc:spChg chg="add">
-          <ac:chgData name="Barnes, Thomas J" userId="37480386-2bb4-40b2-9bcc-723ca760ccb2" providerId="ADAL" clId="{0ED6C77C-EEE1-4E91-AA28-BBB4F5726752}" dt="2020-12-11T22:25:55.607" v="115"/>
-          <ac:spMkLst>
-            <pc:docMk/>
-            <pc:sldMk cId="3044289826" sldId="260"/>
-            <ac:spMk id="25" creationId="{0037DEBE-667F-4E79-A14B-E9D3DD77BCE3}"/>
-          </ac:spMkLst>
-        </pc:spChg>
-      </pc:sldChg>
-    </pc:docChg>
-  </pc:docChgLst>
 </pc:chgInfo>
 </file>
 
@@ -603,7 +606,7 @@
           <a:p>
             <a:fld id="{AD003205-85E0-4114-BC53-AFE7A5F5D57B}" type="datetimeFigureOut">
               <a:rPr lang="en-US" smtClean="0"/>
-              <a:t>12/11/2020</a:t>
+              <a:t>4/29/2021</a:t>
             </a:fld>
             <a:endParaRPr lang="en-US"/>
           </a:p>
@@ -801,7 +804,7 @@
           <a:p>
             <a:fld id="{AD003205-85E0-4114-BC53-AFE7A5F5D57B}" type="datetimeFigureOut">
               <a:rPr lang="en-US" smtClean="0"/>
-              <a:t>12/11/2020</a:t>
+              <a:t>4/29/2021</a:t>
             </a:fld>
             <a:endParaRPr lang="en-US"/>
           </a:p>
@@ -1009,7 +1012,7 @@
           <a:p>
             <a:fld id="{AD003205-85E0-4114-BC53-AFE7A5F5D57B}" type="datetimeFigureOut">
               <a:rPr lang="en-US" smtClean="0"/>
-              <a:t>12/11/2020</a:t>
+              <a:t>4/29/2021</a:t>
             </a:fld>
             <a:endParaRPr lang="en-US"/>
           </a:p>
@@ -1207,7 +1210,7 @@
           <a:p>
             <a:fld id="{AD003205-85E0-4114-BC53-AFE7A5F5D57B}" type="datetimeFigureOut">
               <a:rPr lang="en-US" smtClean="0"/>
-              <a:t>12/11/2020</a:t>
+              <a:t>4/29/2021</a:t>
             </a:fld>
             <a:endParaRPr lang="en-US"/>
           </a:p>
@@ -1482,7 +1485,7 @@
           <a:p>
             <a:fld id="{AD003205-85E0-4114-BC53-AFE7A5F5D57B}" type="datetimeFigureOut">
               <a:rPr lang="en-US" smtClean="0"/>
-              <a:t>12/11/2020</a:t>
+              <a:t>4/29/2021</a:t>
             </a:fld>
             <a:endParaRPr lang="en-US"/>
           </a:p>
@@ -1747,7 +1750,7 @@
           <a:p>
             <a:fld id="{AD003205-85E0-4114-BC53-AFE7A5F5D57B}" type="datetimeFigureOut">
               <a:rPr lang="en-US" smtClean="0"/>
-              <a:t>12/11/2020</a:t>
+              <a:t>4/29/2021</a:t>
             </a:fld>
             <a:endParaRPr lang="en-US"/>
           </a:p>
@@ -2159,7 +2162,7 @@
           <a:p>
             <a:fld id="{AD003205-85E0-4114-BC53-AFE7A5F5D57B}" type="datetimeFigureOut">
               <a:rPr lang="en-US" smtClean="0"/>
-              <a:t>12/11/2020</a:t>
+              <a:t>4/29/2021</a:t>
             </a:fld>
             <a:endParaRPr lang="en-US"/>
           </a:p>
@@ -2300,7 +2303,7 @@
           <a:p>
             <a:fld id="{AD003205-85E0-4114-BC53-AFE7A5F5D57B}" type="datetimeFigureOut">
               <a:rPr lang="en-US" smtClean="0"/>
-              <a:t>12/11/2020</a:t>
+              <a:t>4/29/2021</a:t>
             </a:fld>
             <a:endParaRPr lang="en-US"/>
           </a:p>
@@ -2413,7 +2416,7 @@
           <a:p>
             <a:fld id="{AD003205-85E0-4114-BC53-AFE7A5F5D57B}" type="datetimeFigureOut">
               <a:rPr lang="en-US" smtClean="0"/>
-              <a:t>12/11/2020</a:t>
+              <a:t>4/29/2021</a:t>
             </a:fld>
             <a:endParaRPr lang="en-US"/>
           </a:p>
@@ -2724,7 +2727,7 @@
           <a:p>
             <a:fld id="{AD003205-85E0-4114-BC53-AFE7A5F5D57B}" type="datetimeFigureOut">
               <a:rPr lang="en-US" smtClean="0"/>
-              <a:t>12/11/2020</a:t>
+              <a:t>4/29/2021</a:t>
             </a:fld>
             <a:endParaRPr lang="en-US"/>
           </a:p>
@@ -3012,7 +3015,7 @@
           <a:p>
             <a:fld id="{AD003205-85E0-4114-BC53-AFE7A5F5D57B}" type="datetimeFigureOut">
               <a:rPr lang="en-US" smtClean="0"/>
-              <a:t>12/11/2020</a:t>
+              <a:t>4/29/2021</a:t>
             </a:fld>
             <a:endParaRPr lang="en-US"/>
           </a:p>
@@ -3253,7 +3256,7 @@
           <a:p>
             <a:fld id="{AD003205-85E0-4114-BC53-AFE7A5F5D57B}" type="datetimeFigureOut">
               <a:rPr lang="en-US" smtClean="0"/>
-              <a:t>12/11/2020</a:t>
+              <a:t>4/29/2021</a:t>
             </a:fld>
             <a:endParaRPr lang="en-US"/>
           </a:p>
@@ -3761,6 +3764,658 @@
 </p:sld>
 </file>
 
+<file path=ppt/slides/slide10.xml><?xml version="1.0" encoding="utf-8"?>
+<p:sld xmlns:a="http://schemas.openxmlformats.org/drawingml/2006/main" xmlns:r="http://schemas.openxmlformats.org/officeDocument/2006/relationships" xmlns:p="http://schemas.openxmlformats.org/presentationml/2006/main">
+  <p:cSld>
+    <p:spTree>
+      <p:nvGrpSpPr>
+        <p:cNvPr id="1" name=""/>
+        <p:cNvGrpSpPr/>
+        <p:nvPr/>
+      </p:nvGrpSpPr>
+      <p:grpSpPr>
+        <a:xfrm>
+          <a:off x="0" y="0"/>
+          <a:ext cx="0" cy="0"/>
+          <a:chOff x="0" y="0"/>
+          <a:chExt cx="0" cy="0"/>
+        </a:xfrm>
+      </p:grpSpPr>
+      <p:sp>
+        <p:nvSpPr>
+          <p:cNvPr id="2" name="Rectangle 1">
+            <a:extLst>
+              <a:ext uri="{FF2B5EF4-FFF2-40B4-BE49-F238E27FC236}">
+                <a16:creationId xmlns:a16="http://schemas.microsoft.com/office/drawing/2014/main" id="{ED7CE348-E516-49F3-9527-F327E0C5FA80}"/>
+              </a:ext>
+            </a:extLst>
+          </p:cNvPr>
+          <p:cNvSpPr/>
+          <p:nvPr/>
+        </p:nvSpPr>
+        <p:spPr>
+          <a:xfrm>
+            <a:off x="622169" y="537328"/>
+            <a:ext cx="11095349" cy="5891752"/>
+          </a:xfrm>
+          <a:prstGeom prst="rect">
+            <a:avLst/>
+          </a:prstGeom>
+          <a:solidFill>
+            <a:schemeClr val="bg1"/>
+          </a:solidFill>
+        </p:spPr>
+        <p:style>
+          <a:lnRef idx="2">
+            <a:schemeClr val="accent1">
+              <a:shade val="50000"/>
+            </a:schemeClr>
+          </a:lnRef>
+          <a:fillRef idx="1">
+            <a:schemeClr val="accent1"/>
+          </a:fillRef>
+          <a:effectRef idx="0">
+            <a:schemeClr val="accent1"/>
+          </a:effectRef>
+          <a:fontRef idx="minor">
+            <a:schemeClr val="lt1"/>
+          </a:fontRef>
+        </p:style>
+        <p:txBody>
+          <a:bodyPr rtlCol="0" anchor="ctr"/>
+          <a:lstStyle/>
+          <a:p>
+            <a:pPr algn="ctr"/>
+            <a:endParaRPr lang="en-US"/>
+          </a:p>
+        </p:txBody>
+      </p:sp>
+      <p:sp>
+        <p:nvSpPr>
+          <p:cNvPr id="3" name="Rectangle: Rounded Corners 2">
+            <a:extLst>
+              <a:ext uri="{FF2B5EF4-FFF2-40B4-BE49-F238E27FC236}">
+                <a16:creationId xmlns:a16="http://schemas.microsoft.com/office/drawing/2014/main" id="{5F08DA52-8C1B-459C-8AA6-D24D937DF3A7}"/>
+              </a:ext>
+            </a:extLst>
+          </p:cNvPr>
+          <p:cNvSpPr/>
+          <p:nvPr/>
+        </p:nvSpPr>
+        <p:spPr>
+          <a:xfrm>
+            <a:off x="1140643" y="1404594"/>
+            <a:ext cx="3601039" cy="2564091"/>
+          </a:xfrm>
+          <a:prstGeom prst="roundRect">
+            <a:avLst/>
+          </a:prstGeom>
+          <a:ln/>
+        </p:spPr>
+        <p:style>
+          <a:lnRef idx="2">
+            <a:schemeClr val="accent4">
+              <a:shade val="50000"/>
+            </a:schemeClr>
+          </a:lnRef>
+          <a:fillRef idx="1">
+            <a:schemeClr val="accent4"/>
+          </a:fillRef>
+          <a:effectRef idx="0">
+            <a:schemeClr val="accent4"/>
+          </a:effectRef>
+          <a:fontRef idx="minor">
+            <a:schemeClr val="lt1"/>
+          </a:fontRef>
+        </p:style>
+        <p:txBody>
+          <a:bodyPr rtlCol="0" anchor="ctr"/>
+          <a:lstStyle/>
+          <a:p>
+            <a:pPr algn="ctr"/>
+            <a:r>
+              <a:rPr lang="en-US" sz="2000" dirty="0">
+                <a:solidFill>
+                  <a:schemeClr val="tx1"/>
+                </a:solidFill>
+              </a:rPr>
+              <a:t>Customer Application</a:t>
+            </a:r>
+          </a:p>
+          <a:p>
+            <a:pPr algn="ctr"/>
+            <a:endParaRPr lang="en-US" sz="2000" dirty="0">
+              <a:solidFill>
+                <a:schemeClr val="tx1"/>
+              </a:solidFill>
+            </a:endParaRPr>
+          </a:p>
+          <a:p>
+            <a:pPr algn="ctr"/>
+            <a:r>
+              <a:rPr lang="en-US" sz="2000" dirty="0">
+                <a:solidFill>
+                  <a:schemeClr val="tx1"/>
+                </a:solidFill>
+              </a:rPr>
+              <a:t>Device Management Service</a:t>
+            </a:r>
+          </a:p>
+        </p:txBody>
+      </p:sp>
+      <p:sp>
+        <p:nvSpPr>
+          <p:cNvPr id="4" name="Rectangle: Rounded Corners 3">
+            <a:extLst>
+              <a:ext uri="{FF2B5EF4-FFF2-40B4-BE49-F238E27FC236}">
+                <a16:creationId xmlns:a16="http://schemas.microsoft.com/office/drawing/2014/main" id="{353D7161-60B7-43B5-9B51-0195617C7265}"/>
+              </a:ext>
+            </a:extLst>
+          </p:cNvPr>
+          <p:cNvSpPr/>
+          <p:nvPr/>
+        </p:nvSpPr>
+        <p:spPr>
+          <a:xfrm>
+            <a:off x="6352881" y="1406166"/>
+            <a:ext cx="2772266" cy="1563278"/>
+          </a:xfrm>
+          <a:prstGeom prst="roundRect">
+            <a:avLst/>
+          </a:prstGeom>
+          <a:ln/>
+        </p:spPr>
+        <p:style>
+          <a:lnRef idx="2">
+            <a:schemeClr val="accent6">
+              <a:shade val="50000"/>
+            </a:schemeClr>
+          </a:lnRef>
+          <a:fillRef idx="1">
+            <a:schemeClr val="accent6"/>
+          </a:fillRef>
+          <a:effectRef idx="0">
+            <a:schemeClr val="accent6"/>
+          </a:effectRef>
+          <a:fontRef idx="minor">
+            <a:schemeClr val="lt1"/>
+          </a:fontRef>
+        </p:style>
+        <p:txBody>
+          <a:bodyPr rtlCol="0" anchor="ctr"/>
+          <a:lstStyle/>
+          <a:p>
+            <a:pPr algn="ctr"/>
+            <a:r>
+              <a:rPr lang="en-US" sz="2000" dirty="0">
+                <a:solidFill>
+                  <a:schemeClr val="tx1"/>
+                </a:solidFill>
+              </a:rPr>
+              <a:t>FDO Client SDK</a:t>
+            </a:r>
+          </a:p>
+        </p:txBody>
+      </p:sp>
+      <p:sp>
+        <p:nvSpPr>
+          <p:cNvPr id="5" name="Rectangle: Rounded Corners 4">
+            <a:extLst>
+              <a:ext uri="{FF2B5EF4-FFF2-40B4-BE49-F238E27FC236}">
+                <a16:creationId xmlns:a16="http://schemas.microsoft.com/office/drawing/2014/main" id="{901AACC7-6772-4C9F-A3C2-250D8A355BED}"/>
+              </a:ext>
+            </a:extLst>
+          </p:cNvPr>
+          <p:cNvSpPr/>
+          <p:nvPr/>
+        </p:nvSpPr>
+        <p:spPr>
+          <a:xfrm>
+            <a:off x="6352881" y="2969444"/>
+            <a:ext cx="2772266" cy="999241"/>
+          </a:xfrm>
+          <a:prstGeom prst="roundRect">
+            <a:avLst/>
+          </a:prstGeom>
+          <a:ln/>
+        </p:spPr>
+        <p:style>
+          <a:lnRef idx="2">
+            <a:schemeClr val="accent6">
+              <a:shade val="50000"/>
+            </a:schemeClr>
+          </a:lnRef>
+          <a:fillRef idx="1">
+            <a:schemeClr val="accent6"/>
+          </a:fillRef>
+          <a:effectRef idx="0">
+            <a:schemeClr val="accent6"/>
+          </a:effectRef>
+          <a:fontRef idx="minor">
+            <a:schemeClr val="lt1"/>
+          </a:fontRef>
+        </p:style>
+        <p:txBody>
+          <a:bodyPr rtlCol="0" anchor="ctr"/>
+          <a:lstStyle/>
+          <a:p>
+            <a:pPr algn="ctr"/>
+            <a:r>
+              <a:rPr lang="en-US" sz="2000" dirty="0">
+                <a:solidFill>
+                  <a:schemeClr val="tx1"/>
+                </a:solidFill>
+              </a:rPr>
+              <a:t>Abstraction Layer</a:t>
+            </a:r>
+          </a:p>
+        </p:txBody>
+      </p:sp>
+      <p:sp>
+        <p:nvSpPr>
+          <p:cNvPr id="6" name="Rectangle: Rounded Corners 5">
+            <a:extLst>
+              <a:ext uri="{FF2B5EF4-FFF2-40B4-BE49-F238E27FC236}">
+                <a16:creationId xmlns:a16="http://schemas.microsoft.com/office/drawing/2014/main" id="{9FE54AAA-156B-4FC9-BDB6-976078C93F36}"/>
+              </a:ext>
+            </a:extLst>
+          </p:cNvPr>
+          <p:cNvSpPr/>
+          <p:nvPr/>
+        </p:nvSpPr>
+        <p:spPr>
+          <a:xfrm>
+            <a:off x="9125147" y="2969443"/>
+            <a:ext cx="1611199" cy="999241"/>
+          </a:xfrm>
+          <a:prstGeom prst="roundRect">
+            <a:avLst/>
+          </a:prstGeom>
+          <a:solidFill>
+            <a:schemeClr val="accent1">
+              <a:lumMod val="60000"/>
+              <a:lumOff val="40000"/>
+            </a:schemeClr>
+          </a:solidFill>
+          <a:ln/>
+        </p:spPr>
+        <p:style>
+          <a:lnRef idx="2">
+            <a:schemeClr val="accent6">
+              <a:shade val="50000"/>
+            </a:schemeClr>
+          </a:lnRef>
+          <a:fillRef idx="1">
+            <a:schemeClr val="accent6"/>
+          </a:fillRef>
+          <a:effectRef idx="0">
+            <a:schemeClr val="accent6"/>
+          </a:effectRef>
+          <a:fontRef idx="minor">
+            <a:schemeClr val="lt1"/>
+          </a:fontRef>
+        </p:style>
+        <p:txBody>
+          <a:bodyPr rtlCol="0" anchor="ctr"/>
+          <a:lstStyle/>
+          <a:p>
+            <a:pPr algn="ctr"/>
+            <a:r>
+              <a:rPr lang="en-US" sz="2000" dirty="0">
+                <a:solidFill>
+                  <a:schemeClr val="tx1"/>
+                </a:solidFill>
+              </a:rPr>
+              <a:t>Crypto Lib</a:t>
+            </a:r>
+          </a:p>
+        </p:txBody>
+      </p:sp>
+      <p:sp>
+        <p:nvSpPr>
+          <p:cNvPr id="7" name="Rectangle: Rounded Corners 6">
+            <a:extLst>
+              <a:ext uri="{FF2B5EF4-FFF2-40B4-BE49-F238E27FC236}">
+                <a16:creationId xmlns:a16="http://schemas.microsoft.com/office/drawing/2014/main" id="{831E7EDD-E973-4878-84BD-23DCB2AEDE04}"/>
+              </a:ext>
+            </a:extLst>
+          </p:cNvPr>
+          <p:cNvSpPr/>
+          <p:nvPr/>
+        </p:nvSpPr>
+        <p:spPr>
+          <a:xfrm>
+            <a:off x="1140642" y="4333188"/>
+            <a:ext cx="9595704" cy="999242"/>
+          </a:xfrm>
+          <a:prstGeom prst="roundRect">
+            <a:avLst/>
+          </a:prstGeom>
+          <a:ln/>
+        </p:spPr>
+        <p:style>
+          <a:lnRef idx="2">
+            <a:schemeClr val="accent4">
+              <a:shade val="50000"/>
+            </a:schemeClr>
+          </a:lnRef>
+          <a:fillRef idx="1">
+            <a:schemeClr val="accent4"/>
+          </a:fillRef>
+          <a:effectRef idx="0">
+            <a:schemeClr val="accent4"/>
+          </a:effectRef>
+          <a:fontRef idx="minor">
+            <a:schemeClr val="lt1"/>
+          </a:fontRef>
+        </p:style>
+        <p:txBody>
+          <a:bodyPr rtlCol="0" anchor="ctr"/>
+          <a:lstStyle/>
+          <a:p>
+            <a:pPr algn="ctr"/>
+            <a:endParaRPr lang="en-US" sz="2000" dirty="0">
+              <a:solidFill>
+                <a:schemeClr val="tx1"/>
+              </a:solidFill>
+            </a:endParaRPr>
+          </a:p>
+        </p:txBody>
+      </p:sp>
+      <p:sp>
+        <p:nvSpPr>
+          <p:cNvPr id="8" name="TextBox 7">
+            <a:extLst>
+              <a:ext uri="{FF2B5EF4-FFF2-40B4-BE49-F238E27FC236}">
+                <a16:creationId xmlns:a16="http://schemas.microsoft.com/office/drawing/2014/main" id="{205D3472-7AE6-4394-8A38-9607B2D5B5F4}"/>
+              </a:ext>
+            </a:extLst>
+          </p:cNvPr>
+          <p:cNvSpPr txBox="1"/>
+          <p:nvPr/>
+        </p:nvSpPr>
+        <p:spPr>
+          <a:xfrm>
+            <a:off x="1282045" y="4511222"/>
+            <a:ext cx="3459637" cy="923330"/>
+          </a:xfrm>
+          <a:prstGeom prst="rect">
+            <a:avLst/>
+          </a:prstGeom>
+          <a:noFill/>
+        </p:spPr>
+        <p:txBody>
+          <a:bodyPr wrap="square" rtlCol="0">
+            <a:spAutoFit/>
+          </a:bodyPr>
+          <a:lstStyle/>
+          <a:p>
+            <a:r>
+              <a:rPr lang="en-US" dirty="0"/>
+              <a:t>Linux* OS</a:t>
+            </a:r>
+          </a:p>
+          <a:p>
+            <a:r>
+              <a:rPr lang="en-US" dirty="0"/>
+              <a:t>(Ubuntu* OS v20.04 LTS)</a:t>
+            </a:r>
+          </a:p>
+          <a:p>
+            <a:endParaRPr lang="en-US" dirty="0"/>
+          </a:p>
+        </p:txBody>
+      </p:sp>
+      <p:sp>
+        <p:nvSpPr>
+          <p:cNvPr id="9" name="Rectangle: Rounded Corners 8">
+            <a:extLst>
+              <a:ext uri="{FF2B5EF4-FFF2-40B4-BE49-F238E27FC236}">
+                <a16:creationId xmlns:a16="http://schemas.microsoft.com/office/drawing/2014/main" id="{8BF6F97E-117E-4EA2-8449-61D793374ABA}"/>
+              </a:ext>
+            </a:extLst>
+          </p:cNvPr>
+          <p:cNvSpPr/>
+          <p:nvPr/>
+        </p:nvSpPr>
+        <p:spPr>
+          <a:xfrm>
+            <a:off x="6559880" y="4537682"/>
+            <a:ext cx="1780880" cy="435205"/>
+          </a:xfrm>
+          <a:prstGeom prst="roundRect">
+            <a:avLst/>
+          </a:prstGeom>
+          <a:solidFill>
+            <a:srgbClr val="FFC000"/>
+          </a:solidFill>
+          <a:ln/>
+        </p:spPr>
+        <p:style>
+          <a:lnRef idx="2">
+            <a:schemeClr val="accent6">
+              <a:shade val="50000"/>
+            </a:schemeClr>
+          </a:lnRef>
+          <a:fillRef idx="1">
+            <a:schemeClr val="accent6"/>
+          </a:fillRef>
+          <a:effectRef idx="0">
+            <a:schemeClr val="accent6"/>
+          </a:effectRef>
+          <a:fontRef idx="minor">
+            <a:schemeClr val="lt1"/>
+          </a:fontRef>
+        </p:style>
+        <p:txBody>
+          <a:bodyPr rtlCol="0" anchor="ctr"/>
+          <a:lstStyle/>
+          <a:p>
+            <a:pPr algn="ctr"/>
+            <a:r>
+              <a:rPr lang="en-US" sz="2000" dirty="0">
+                <a:solidFill>
+                  <a:schemeClr val="tx1"/>
+                </a:solidFill>
+              </a:rPr>
+              <a:t>Network</a:t>
+            </a:r>
+          </a:p>
+        </p:txBody>
+      </p:sp>
+      <p:sp>
+        <p:nvSpPr>
+          <p:cNvPr id="10" name="Rectangle: Rounded Corners 9">
+            <a:extLst>
+              <a:ext uri="{FF2B5EF4-FFF2-40B4-BE49-F238E27FC236}">
+                <a16:creationId xmlns:a16="http://schemas.microsoft.com/office/drawing/2014/main" id="{96D1B16B-43AB-4B15-9EFA-CDE86893E86C}"/>
+              </a:ext>
+            </a:extLst>
+          </p:cNvPr>
+          <p:cNvSpPr/>
+          <p:nvPr/>
+        </p:nvSpPr>
+        <p:spPr>
+          <a:xfrm>
+            <a:off x="8648113" y="4537682"/>
+            <a:ext cx="1780880" cy="435205"/>
+          </a:xfrm>
+          <a:prstGeom prst="roundRect">
+            <a:avLst/>
+          </a:prstGeom>
+          <a:solidFill>
+            <a:srgbClr val="FFC000"/>
+          </a:solidFill>
+          <a:ln/>
+        </p:spPr>
+        <p:style>
+          <a:lnRef idx="2">
+            <a:schemeClr val="accent6">
+              <a:shade val="50000"/>
+            </a:schemeClr>
+          </a:lnRef>
+          <a:fillRef idx="1">
+            <a:schemeClr val="accent6"/>
+          </a:fillRef>
+          <a:effectRef idx="0">
+            <a:schemeClr val="accent6"/>
+          </a:effectRef>
+          <a:fontRef idx="minor">
+            <a:schemeClr val="lt1"/>
+          </a:fontRef>
+        </p:style>
+        <p:txBody>
+          <a:bodyPr rtlCol="0" anchor="ctr"/>
+          <a:lstStyle/>
+          <a:p>
+            <a:pPr algn="ctr"/>
+            <a:r>
+              <a:rPr lang="en-US" sz="2000" dirty="0">
+                <a:solidFill>
+                  <a:schemeClr val="tx1"/>
+                </a:solidFill>
+              </a:rPr>
+              <a:t>Storage</a:t>
+            </a:r>
+          </a:p>
+        </p:txBody>
+      </p:sp>
+      <p:cxnSp>
+        <p:nvCxnSpPr>
+          <p:cNvPr id="12" name="Straight Arrow Connector 11">
+            <a:extLst>
+              <a:ext uri="{FF2B5EF4-FFF2-40B4-BE49-F238E27FC236}">
+                <a16:creationId xmlns:a16="http://schemas.microsoft.com/office/drawing/2014/main" id="{B7F69BC2-B6F1-4103-9A6E-C0EBEB468B9C}"/>
+              </a:ext>
+            </a:extLst>
+          </p:cNvPr>
+          <p:cNvCxnSpPr/>
+          <p:nvPr/>
+        </p:nvCxnSpPr>
+        <p:spPr>
+          <a:xfrm>
+            <a:off x="4741682" y="1960775"/>
+            <a:ext cx="1611199" cy="0"/>
+          </a:xfrm>
+          <a:prstGeom prst="straightConnector1">
+            <a:avLst/>
+          </a:prstGeom>
+          <a:ln w="38100">
+            <a:headEnd type="triangle" w="med" len="med"/>
+            <a:tailEnd type="triangle" w="med" len="med"/>
+          </a:ln>
+        </p:spPr>
+        <p:style>
+          <a:lnRef idx="3">
+            <a:schemeClr val="dk1"/>
+          </a:lnRef>
+          <a:fillRef idx="0">
+            <a:schemeClr val="dk1"/>
+          </a:fillRef>
+          <a:effectRef idx="2">
+            <a:schemeClr val="dk1"/>
+          </a:effectRef>
+          <a:fontRef idx="minor">
+            <a:schemeClr val="tx1"/>
+          </a:fontRef>
+        </p:style>
+      </p:cxnSp>
+      <p:cxnSp>
+        <p:nvCxnSpPr>
+          <p:cNvPr id="14" name="Straight Arrow Connector 13">
+            <a:extLst>
+              <a:ext uri="{FF2B5EF4-FFF2-40B4-BE49-F238E27FC236}">
+                <a16:creationId xmlns:a16="http://schemas.microsoft.com/office/drawing/2014/main" id="{DEC63E12-2C7D-4196-922F-C1910022878C}"/>
+              </a:ext>
+            </a:extLst>
+          </p:cNvPr>
+          <p:cNvCxnSpPr>
+            <a:cxnSpLocks/>
+            <a:endCxn id="9" idx="0"/>
+          </p:cNvCxnSpPr>
+          <p:nvPr/>
+        </p:nvCxnSpPr>
+        <p:spPr>
+          <a:xfrm>
+            <a:off x="7450320" y="3978112"/>
+            <a:ext cx="0" cy="559570"/>
+          </a:xfrm>
+          <a:prstGeom prst="straightConnector1">
+            <a:avLst/>
+          </a:prstGeom>
+          <a:ln w="38100">
+            <a:tailEnd type="triangle"/>
+          </a:ln>
+        </p:spPr>
+        <p:style>
+          <a:lnRef idx="1">
+            <a:schemeClr val="dk1"/>
+          </a:lnRef>
+          <a:fillRef idx="0">
+            <a:schemeClr val="dk1"/>
+          </a:fillRef>
+          <a:effectRef idx="0">
+            <a:schemeClr val="dk1"/>
+          </a:effectRef>
+          <a:fontRef idx="minor">
+            <a:schemeClr val="tx1"/>
+          </a:fontRef>
+        </p:style>
+      </p:cxnSp>
+      <p:cxnSp>
+        <p:nvCxnSpPr>
+          <p:cNvPr id="16" name="Straight Arrow Connector 15">
+            <a:extLst>
+              <a:ext uri="{FF2B5EF4-FFF2-40B4-BE49-F238E27FC236}">
+                <a16:creationId xmlns:a16="http://schemas.microsoft.com/office/drawing/2014/main" id="{E30DA923-64FA-42B3-861B-95926DACA395}"/>
+              </a:ext>
+            </a:extLst>
+          </p:cNvPr>
+          <p:cNvCxnSpPr>
+            <a:cxnSpLocks/>
+          </p:cNvCxnSpPr>
+          <p:nvPr/>
+        </p:nvCxnSpPr>
+        <p:spPr>
+          <a:xfrm>
+            <a:off x="8809350" y="3951652"/>
+            <a:ext cx="0" cy="559570"/>
+          </a:xfrm>
+          <a:prstGeom prst="straightConnector1">
+            <a:avLst/>
+          </a:prstGeom>
+          <a:ln w="38100">
+            <a:tailEnd type="triangle"/>
+          </a:ln>
+        </p:spPr>
+        <p:style>
+          <a:lnRef idx="1">
+            <a:schemeClr val="dk1"/>
+          </a:lnRef>
+          <a:fillRef idx="0">
+            <a:schemeClr val="dk1"/>
+          </a:fillRef>
+          <a:effectRef idx="0">
+            <a:schemeClr val="dk1"/>
+          </a:effectRef>
+          <a:fontRef idx="minor">
+            <a:schemeClr val="tx1"/>
+          </a:fontRef>
+        </p:style>
+      </p:cxnSp>
+    </p:spTree>
+    <p:extLst>
+      <p:ext uri="{BB962C8B-B14F-4D97-AF65-F5344CB8AC3E}">
+        <p14:creationId xmlns:p14="http://schemas.microsoft.com/office/powerpoint/2010/main" val="2422697797"/>
+      </p:ext>
+    </p:extLst>
+  </p:cSld>
+  <p:clrMapOvr>
+    <a:masterClrMapping/>
+  </p:clrMapOvr>
+</p:sld>
+</file>
+
 <file path=ppt/slides/slide2.xml><?xml version="1.0" encoding="utf-8"?>
 <p:sld xmlns:a="http://schemas.openxmlformats.org/drawingml/2006/main" xmlns:r="http://schemas.openxmlformats.org/officeDocument/2006/relationships" xmlns:p="http://schemas.openxmlformats.org/presentationml/2006/main">
   <p:cSld>
@@ -3824,7 +4479,9 @@
         </p:nvSpPr>
         <p:spPr/>
         <p:txBody>
-          <a:bodyPr/>
+          <a:bodyPr>
+            <a:normAutofit/>
+          </a:bodyPr>
           <a:lstStyle/>
           <a:p>
             <a:r>
@@ -3848,6 +4505,24 @@
             <a:r>
               <a:rPr lang="en-US" dirty="0"/>
               <a:t>Slide 6: Figure 4 – Receive Message Flowchart</a:t>
+            </a:r>
+          </a:p>
+          <a:p>
+            <a:r>
+              <a:rPr lang="en-US" dirty="0"/>
+              <a:t>Slide 7: Figure 5 – Service Info Exchanges between Device and Owner Server</a:t>
+            </a:r>
+          </a:p>
+          <a:p>
+            <a:r>
+              <a:rPr lang="en-US" dirty="0"/>
+              <a:t>Slide 8: Figure 6 – Integrated Image and Execution Flow</a:t>
+            </a:r>
+          </a:p>
+          <a:p>
+            <a:r>
+              <a:rPr lang="en-US" dirty="0"/>
+              <a:t>Slide 9: Figure 7 – FDO Client SDK Block Diagram</a:t>
             </a:r>
           </a:p>
         </p:txBody>
@@ -9684,6 +10359,1360 @@
     <p:extLst>
       <p:ext uri="{BB962C8B-B14F-4D97-AF65-F5344CB8AC3E}">
         <p14:creationId xmlns:p14="http://schemas.microsoft.com/office/powerpoint/2010/main" val="664985486"/>
+      </p:ext>
+    </p:extLst>
+  </p:cSld>
+  <p:clrMapOvr>
+    <a:masterClrMapping/>
+  </p:clrMapOvr>
+</p:sld>
+</file>
+
+<file path=ppt/slides/slide8.xml><?xml version="1.0" encoding="utf-8"?>
+<p:sld xmlns:a="http://schemas.openxmlformats.org/drawingml/2006/main" xmlns:r="http://schemas.openxmlformats.org/officeDocument/2006/relationships" xmlns:p="http://schemas.openxmlformats.org/presentationml/2006/main">
+  <p:cSld>
+    <p:spTree>
+      <p:nvGrpSpPr>
+        <p:cNvPr id="1" name=""/>
+        <p:cNvGrpSpPr/>
+        <p:nvPr/>
+      </p:nvGrpSpPr>
+      <p:grpSpPr>
+        <a:xfrm>
+          <a:off x="0" y="0"/>
+          <a:ext cx="0" cy="0"/>
+          <a:chOff x="0" y="0"/>
+          <a:chExt cx="0" cy="0"/>
+        </a:xfrm>
+      </p:grpSpPr>
+      <p:sp>
+        <p:nvSpPr>
+          <p:cNvPr id="4" name="Rectangle 3">
+            <a:extLst>
+              <a:ext uri="{FF2B5EF4-FFF2-40B4-BE49-F238E27FC236}">
+                <a16:creationId xmlns:a16="http://schemas.microsoft.com/office/drawing/2014/main" id="{C811792B-A74B-4A06-8735-6BBA546201E7}"/>
+              </a:ext>
+            </a:extLst>
+          </p:cNvPr>
+          <p:cNvSpPr/>
+          <p:nvPr/>
+        </p:nvSpPr>
+        <p:spPr>
+          <a:xfrm>
+            <a:off x="248730" y="288401"/>
+            <a:ext cx="11468100" cy="5686425"/>
+          </a:xfrm>
+          <a:prstGeom prst="rect">
+            <a:avLst/>
+          </a:prstGeom>
+          <a:solidFill>
+            <a:schemeClr val="bg1"/>
+          </a:solidFill>
+        </p:spPr>
+        <p:style>
+          <a:lnRef idx="2">
+            <a:schemeClr val="accent1">
+              <a:shade val="50000"/>
+            </a:schemeClr>
+          </a:lnRef>
+          <a:fillRef idx="1">
+            <a:schemeClr val="accent1"/>
+          </a:fillRef>
+          <a:effectRef idx="0">
+            <a:schemeClr val="accent1"/>
+          </a:effectRef>
+          <a:fontRef idx="minor">
+            <a:schemeClr val="lt1"/>
+          </a:fontRef>
+        </p:style>
+        <p:txBody>
+          <a:bodyPr rtlCol="0" anchor="ctr"/>
+          <a:lstStyle/>
+          <a:p>
+            <a:pPr algn="ctr"/>
+            <a:endParaRPr lang="en-US" dirty="0"/>
+          </a:p>
+        </p:txBody>
+      </p:sp>
+      <p:sp>
+        <p:nvSpPr>
+          <p:cNvPr id="5" name="Rectangle 4">
+            <a:extLst>
+              <a:ext uri="{FF2B5EF4-FFF2-40B4-BE49-F238E27FC236}">
+                <a16:creationId xmlns:a16="http://schemas.microsoft.com/office/drawing/2014/main" id="{37920B20-9587-417A-95ED-6E257DA06278}"/>
+              </a:ext>
+            </a:extLst>
+          </p:cNvPr>
+          <p:cNvSpPr/>
+          <p:nvPr/>
+        </p:nvSpPr>
+        <p:spPr>
+          <a:xfrm>
+            <a:off x="1121790" y="4449452"/>
+            <a:ext cx="3421930" cy="1300899"/>
+          </a:xfrm>
+          <a:prstGeom prst="rect">
+            <a:avLst/>
+          </a:prstGeom>
+          <a:solidFill>
+            <a:schemeClr val="bg1"/>
+          </a:solidFill>
+        </p:spPr>
+        <p:style>
+          <a:lnRef idx="2">
+            <a:schemeClr val="accent1">
+              <a:shade val="50000"/>
+            </a:schemeClr>
+          </a:lnRef>
+          <a:fillRef idx="1">
+            <a:schemeClr val="accent1"/>
+          </a:fillRef>
+          <a:effectRef idx="0">
+            <a:schemeClr val="accent1"/>
+          </a:effectRef>
+          <a:fontRef idx="minor">
+            <a:schemeClr val="lt1"/>
+          </a:fontRef>
+        </p:style>
+        <p:txBody>
+          <a:bodyPr rtlCol="0" anchor="ctr"/>
+          <a:lstStyle/>
+          <a:p>
+            <a:pPr algn="ctr"/>
+            <a:r>
+              <a:rPr lang="en-US" dirty="0">
+                <a:solidFill>
+                  <a:schemeClr val="tx1"/>
+                </a:solidFill>
+              </a:rPr>
+              <a:t>FIDO Device Onboard</a:t>
+            </a:r>
+          </a:p>
+          <a:p>
+            <a:pPr algn="ctr"/>
+            <a:r>
+              <a:rPr lang="en-US" dirty="0">
+                <a:solidFill>
+                  <a:schemeClr val="tx1"/>
+                </a:solidFill>
+              </a:rPr>
+              <a:t>Client SDK</a:t>
+            </a:r>
+          </a:p>
+        </p:txBody>
+      </p:sp>
+      <p:sp>
+        <p:nvSpPr>
+          <p:cNvPr id="6" name="Rectangle 5">
+            <a:extLst>
+              <a:ext uri="{FF2B5EF4-FFF2-40B4-BE49-F238E27FC236}">
+                <a16:creationId xmlns:a16="http://schemas.microsoft.com/office/drawing/2014/main" id="{EFD054A0-13D0-4D12-87DC-3D3EA7C3BE6D}"/>
+              </a:ext>
+            </a:extLst>
+          </p:cNvPr>
+          <p:cNvSpPr/>
+          <p:nvPr/>
+        </p:nvSpPr>
+        <p:spPr>
+          <a:xfrm>
+            <a:off x="7495880" y="4449451"/>
+            <a:ext cx="3421930" cy="1300899"/>
+          </a:xfrm>
+          <a:prstGeom prst="rect">
+            <a:avLst/>
+          </a:prstGeom>
+          <a:solidFill>
+            <a:schemeClr val="bg1"/>
+          </a:solidFill>
+        </p:spPr>
+        <p:style>
+          <a:lnRef idx="2">
+            <a:schemeClr val="accent1">
+              <a:shade val="50000"/>
+            </a:schemeClr>
+          </a:lnRef>
+          <a:fillRef idx="1">
+            <a:schemeClr val="accent1"/>
+          </a:fillRef>
+          <a:effectRef idx="0">
+            <a:schemeClr val="accent1"/>
+          </a:effectRef>
+          <a:fontRef idx="minor">
+            <a:schemeClr val="lt1"/>
+          </a:fontRef>
+        </p:style>
+        <p:txBody>
+          <a:bodyPr rtlCol="0" anchor="ctr"/>
+          <a:lstStyle/>
+          <a:p>
+            <a:pPr algn="ctr"/>
+            <a:r>
+              <a:rPr lang="en-US" dirty="0">
+                <a:solidFill>
+                  <a:schemeClr val="tx1"/>
+                </a:solidFill>
+              </a:rPr>
+              <a:t>FIDO Device Onboard</a:t>
+            </a:r>
+          </a:p>
+          <a:p>
+            <a:pPr algn="ctr"/>
+            <a:r>
+              <a:rPr lang="en-US" dirty="0">
+                <a:solidFill>
+                  <a:schemeClr val="tx1"/>
+                </a:solidFill>
+              </a:rPr>
+              <a:t>Owner</a:t>
+            </a:r>
+          </a:p>
+        </p:txBody>
+      </p:sp>
+      <p:sp>
+        <p:nvSpPr>
+          <p:cNvPr id="7" name="Arrow: Right 6">
+            <a:extLst>
+              <a:ext uri="{FF2B5EF4-FFF2-40B4-BE49-F238E27FC236}">
+                <a16:creationId xmlns:a16="http://schemas.microsoft.com/office/drawing/2014/main" id="{0A70145C-7CF7-4C6D-9325-89BCEE7F94E1}"/>
+              </a:ext>
+            </a:extLst>
+          </p:cNvPr>
+          <p:cNvSpPr/>
+          <p:nvPr/>
+        </p:nvSpPr>
+        <p:spPr>
+          <a:xfrm>
+            <a:off x="4543720" y="4628561"/>
+            <a:ext cx="2952160" cy="320511"/>
+          </a:xfrm>
+          <a:prstGeom prst="rightArrow">
+            <a:avLst/>
+          </a:prstGeom>
+          <a:solidFill>
+            <a:schemeClr val="bg1"/>
+          </a:solidFill>
+        </p:spPr>
+        <p:style>
+          <a:lnRef idx="2">
+            <a:schemeClr val="accent1">
+              <a:shade val="50000"/>
+            </a:schemeClr>
+          </a:lnRef>
+          <a:fillRef idx="1">
+            <a:schemeClr val="accent1"/>
+          </a:fillRef>
+          <a:effectRef idx="0">
+            <a:schemeClr val="accent1"/>
+          </a:effectRef>
+          <a:fontRef idx="minor">
+            <a:schemeClr val="lt1"/>
+          </a:fontRef>
+        </p:style>
+        <p:txBody>
+          <a:bodyPr rtlCol="0" anchor="ctr"/>
+          <a:lstStyle/>
+          <a:p>
+            <a:pPr algn="ctr"/>
+            <a:endParaRPr lang="en-US"/>
+          </a:p>
+        </p:txBody>
+      </p:sp>
+      <p:sp>
+        <p:nvSpPr>
+          <p:cNvPr id="8" name="Arrow: Left 7">
+            <a:extLst>
+              <a:ext uri="{FF2B5EF4-FFF2-40B4-BE49-F238E27FC236}">
+                <a16:creationId xmlns:a16="http://schemas.microsoft.com/office/drawing/2014/main" id="{71568140-0F0D-453B-AA6B-35A23C408048}"/>
+              </a:ext>
+            </a:extLst>
+          </p:cNvPr>
+          <p:cNvSpPr/>
+          <p:nvPr/>
+        </p:nvSpPr>
+        <p:spPr>
+          <a:xfrm>
+            <a:off x="4543720" y="5316715"/>
+            <a:ext cx="2952160" cy="311084"/>
+          </a:xfrm>
+          <a:prstGeom prst="leftArrow">
+            <a:avLst/>
+          </a:prstGeom>
+          <a:solidFill>
+            <a:schemeClr val="bg1"/>
+          </a:solidFill>
+        </p:spPr>
+        <p:style>
+          <a:lnRef idx="2">
+            <a:schemeClr val="accent1">
+              <a:shade val="50000"/>
+            </a:schemeClr>
+          </a:lnRef>
+          <a:fillRef idx="1">
+            <a:schemeClr val="accent1"/>
+          </a:fillRef>
+          <a:effectRef idx="0">
+            <a:schemeClr val="accent1"/>
+          </a:effectRef>
+          <a:fontRef idx="minor">
+            <a:schemeClr val="lt1"/>
+          </a:fontRef>
+        </p:style>
+        <p:txBody>
+          <a:bodyPr rtlCol="0" anchor="ctr"/>
+          <a:lstStyle/>
+          <a:p>
+            <a:pPr algn="ctr"/>
+            <a:endParaRPr lang="en-US"/>
+          </a:p>
+        </p:txBody>
+      </p:sp>
+      <p:sp>
+        <p:nvSpPr>
+          <p:cNvPr id="9" name="TextBox 8">
+            <a:extLst>
+              <a:ext uri="{FF2B5EF4-FFF2-40B4-BE49-F238E27FC236}">
+                <a16:creationId xmlns:a16="http://schemas.microsoft.com/office/drawing/2014/main" id="{22A65EE6-45AE-43B9-8B3F-E5F8FC043F2E}"/>
+              </a:ext>
+            </a:extLst>
+          </p:cNvPr>
+          <p:cNvSpPr txBox="1"/>
+          <p:nvPr/>
+        </p:nvSpPr>
+        <p:spPr>
+          <a:xfrm>
+            <a:off x="4706629" y="4427896"/>
+            <a:ext cx="2619078" cy="307777"/>
+          </a:xfrm>
+          <a:prstGeom prst="rect">
+            <a:avLst/>
+          </a:prstGeom>
+          <a:noFill/>
+        </p:spPr>
+        <p:txBody>
+          <a:bodyPr wrap="square" rtlCol="0">
+            <a:spAutoFit/>
+          </a:bodyPr>
+          <a:lstStyle/>
+          <a:p>
+            <a:r>
+              <a:rPr lang="en-US" sz="1400" dirty="0"/>
+              <a:t>Multi-round Device </a:t>
+            </a:r>
+            <a:r>
+              <a:rPr lang="en-US" sz="1400" dirty="0" err="1"/>
+              <a:t>ServiceInfo</a:t>
+            </a:r>
+            <a:endParaRPr lang="en-US" sz="1400" dirty="0"/>
+          </a:p>
+        </p:txBody>
+      </p:sp>
+      <p:sp>
+        <p:nvSpPr>
+          <p:cNvPr id="11" name="Rectangle 10">
+            <a:extLst>
+              <a:ext uri="{FF2B5EF4-FFF2-40B4-BE49-F238E27FC236}">
+                <a16:creationId xmlns:a16="http://schemas.microsoft.com/office/drawing/2014/main" id="{E3EC4097-50DC-483D-A552-ECD3959CB7E2}"/>
+              </a:ext>
+            </a:extLst>
+          </p:cNvPr>
+          <p:cNvSpPr/>
+          <p:nvPr/>
+        </p:nvSpPr>
+        <p:spPr>
+          <a:xfrm>
+            <a:off x="1047948" y="2612780"/>
+            <a:ext cx="1280474" cy="789896"/>
+          </a:xfrm>
+          <a:prstGeom prst="rect">
+            <a:avLst/>
+          </a:prstGeom>
+          <a:solidFill>
+            <a:schemeClr val="bg1"/>
+          </a:solidFill>
+        </p:spPr>
+        <p:style>
+          <a:lnRef idx="2">
+            <a:schemeClr val="accent1">
+              <a:shade val="50000"/>
+            </a:schemeClr>
+          </a:lnRef>
+          <a:fillRef idx="1">
+            <a:schemeClr val="accent1"/>
+          </a:fillRef>
+          <a:effectRef idx="0">
+            <a:schemeClr val="accent1"/>
+          </a:effectRef>
+          <a:fontRef idx="minor">
+            <a:schemeClr val="lt1"/>
+          </a:fontRef>
+        </p:style>
+        <p:txBody>
+          <a:bodyPr rtlCol="0" anchor="ctr"/>
+          <a:lstStyle/>
+          <a:p>
+            <a:pPr algn="ctr"/>
+            <a:r>
+              <a:rPr lang="en-US" dirty="0">
+                <a:solidFill>
+                  <a:schemeClr val="tx1"/>
+                </a:solidFill>
+              </a:rPr>
+              <a:t>Application</a:t>
+            </a:r>
+          </a:p>
+        </p:txBody>
+      </p:sp>
+      <p:sp>
+        <p:nvSpPr>
+          <p:cNvPr id="12" name="Rectangle 11">
+            <a:extLst>
+              <a:ext uri="{FF2B5EF4-FFF2-40B4-BE49-F238E27FC236}">
+                <a16:creationId xmlns:a16="http://schemas.microsoft.com/office/drawing/2014/main" id="{5731F07B-4C3F-40E2-AE29-228F3DCA53B8}"/>
+              </a:ext>
+            </a:extLst>
+          </p:cNvPr>
+          <p:cNvSpPr/>
+          <p:nvPr/>
+        </p:nvSpPr>
+        <p:spPr>
+          <a:xfrm>
+            <a:off x="2648933" y="1171056"/>
+            <a:ext cx="933254" cy="789896"/>
+          </a:xfrm>
+          <a:prstGeom prst="rect">
+            <a:avLst/>
+          </a:prstGeom>
+          <a:solidFill>
+            <a:schemeClr val="bg1"/>
+          </a:solidFill>
+        </p:spPr>
+        <p:style>
+          <a:lnRef idx="2">
+            <a:schemeClr val="accent1">
+              <a:shade val="50000"/>
+            </a:schemeClr>
+          </a:lnRef>
+          <a:fillRef idx="1">
+            <a:schemeClr val="accent1"/>
+          </a:fillRef>
+          <a:effectRef idx="0">
+            <a:schemeClr val="accent1"/>
+          </a:effectRef>
+          <a:fontRef idx="minor">
+            <a:schemeClr val="lt1"/>
+          </a:fontRef>
+        </p:style>
+        <p:txBody>
+          <a:bodyPr rtlCol="0" anchor="ctr"/>
+          <a:lstStyle/>
+          <a:p>
+            <a:pPr algn="ctr"/>
+            <a:r>
+              <a:rPr lang="en-US" dirty="0">
+                <a:solidFill>
+                  <a:schemeClr val="tx1"/>
+                </a:solidFill>
+              </a:rPr>
+              <a:t>Module 1</a:t>
+            </a:r>
+          </a:p>
+        </p:txBody>
+      </p:sp>
+      <p:sp>
+        <p:nvSpPr>
+          <p:cNvPr id="13" name="Rectangle 12">
+            <a:extLst>
+              <a:ext uri="{FF2B5EF4-FFF2-40B4-BE49-F238E27FC236}">
+                <a16:creationId xmlns:a16="http://schemas.microsoft.com/office/drawing/2014/main" id="{456B6B9A-50F4-4827-A4AF-2FD42B43E722}"/>
+              </a:ext>
+            </a:extLst>
+          </p:cNvPr>
+          <p:cNvSpPr/>
+          <p:nvPr/>
+        </p:nvSpPr>
+        <p:spPr>
+          <a:xfrm>
+            <a:off x="3291527" y="2612780"/>
+            <a:ext cx="933254" cy="789896"/>
+          </a:xfrm>
+          <a:prstGeom prst="rect">
+            <a:avLst/>
+          </a:prstGeom>
+          <a:solidFill>
+            <a:schemeClr val="bg1"/>
+          </a:solidFill>
+        </p:spPr>
+        <p:style>
+          <a:lnRef idx="2">
+            <a:schemeClr val="accent1">
+              <a:shade val="50000"/>
+            </a:schemeClr>
+          </a:lnRef>
+          <a:fillRef idx="1">
+            <a:schemeClr val="accent1"/>
+          </a:fillRef>
+          <a:effectRef idx="0">
+            <a:schemeClr val="accent1"/>
+          </a:effectRef>
+          <a:fontRef idx="minor">
+            <a:schemeClr val="lt1"/>
+          </a:fontRef>
+        </p:style>
+        <p:txBody>
+          <a:bodyPr rtlCol="0" anchor="ctr"/>
+          <a:lstStyle/>
+          <a:p>
+            <a:pPr algn="ctr"/>
+            <a:r>
+              <a:rPr lang="en-US" dirty="0">
+                <a:solidFill>
+                  <a:schemeClr val="tx1"/>
+                </a:solidFill>
+              </a:rPr>
+              <a:t>Module 2</a:t>
+            </a:r>
+          </a:p>
+        </p:txBody>
+      </p:sp>
+      <p:sp>
+        <p:nvSpPr>
+          <p:cNvPr id="14" name="Rectangle 13">
+            <a:extLst>
+              <a:ext uri="{FF2B5EF4-FFF2-40B4-BE49-F238E27FC236}">
+                <a16:creationId xmlns:a16="http://schemas.microsoft.com/office/drawing/2014/main" id="{6DEE8E30-35B1-4E3A-B658-8FA9CB6ABC80}"/>
+              </a:ext>
+            </a:extLst>
+          </p:cNvPr>
+          <p:cNvSpPr/>
+          <p:nvPr/>
+        </p:nvSpPr>
+        <p:spPr>
+          <a:xfrm>
+            <a:off x="7685994" y="2623775"/>
+            <a:ext cx="933254" cy="789896"/>
+          </a:xfrm>
+          <a:prstGeom prst="rect">
+            <a:avLst/>
+          </a:prstGeom>
+          <a:solidFill>
+            <a:schemeClr val="bg1"/>
+          </a:solidFill>
+        </p:spPr>
+        <p:style>
+          <a:lnRef idx="2">
+            <a:schemeClr val="accent1">
+              <a:shade val="50000"/>
+            </a:schemeClr>
+          </a:lnRef>
+          <a:fillRef idx="1">
+            <a:schemeClr val="accent1"/>
+          </a:fillRef>
+          <a:effectRef idx="0">
+            <a:schemeClr val="accent1"/>
+          </a:effectRef>
+          <a:fontRef idx="minor">
+            <a:schemeClr val="lt1"/>
+          </a:fontRef>
+        </p:style>
+        <p:txBody>
+          <a:bodyPr rtlCol="0" anchor="ctr"/>
+          <a:lstStyle/>
+          <a:p>
+            <a:pPr algn="ctr"/>
+            <a:r>
+              <a:rPr lang="en-US" dirty="0">
+                <a:solidFill>
+                  <a:schemeClr val="tx1"/>
+                </a:solidFill>
+              </a:rPr>
+              <a:t>Module 2</a:t>
+            </a:r>
+          </a:p>
+        </p:txBody>
+      </p:sp>
+      <p:sp>
+        <p:nvSpPr>
+          <p:cNvPr id="15" name="Rectangle 14">
+            <a:extLst>
+              <a:ext uri="{FF2B5EF4-FFF2-40B4-BE49-F238E27FC236}">
+                <a16:creationId xmlns:a16="http://schemas.microsoft.com/office/drawing/2014/main" id="{E5A4C2FD-2AD7-49F5-B432-3D1E466DBEB8}"/>
+              </a:ext>
+            </a:extLst>
+          </p:cNvPr>
+          <p:cNvSpPr/>
+          <p:nvPr/>
+        </p:nvSpPr>
+        <p:spPr>
+          <a:xfrm>
+            <a:off x="8259446" y="1182051"/>
+            <a:ext cx="933254" cy="789896"/>
+          </a:xfrm>
+          <a:prstGeom prst="rect">
+            <a:avLst/>
+          </a:prstGeom>
+          <a:solidFill>
+            <a:schemeClr val="bg1"/>
+          </a:solidFill>
+        </p:spPr>
+        <p:style>
+          <a:lnRef idx="2">
+            <a:schemeClr val="accent1">
+              <a:shade val="50000"/>
+            </a:schemeClr>
+          </a:lnRef>
+          <a:fillRef idx="1">
+            <a:schemeClr val="accent1"/>
+          </a:fillRef>
+          <a:effectRef idx="0">
+            <a:schemeClr val="accent1"/>
+          </a:effectRef>
+          <a:fontRef idx="minor">
+            <a:schemeClr val="lt1"/>
+          </a:fontRef>
+        </p:style>
+        <p:txBody>
+          <a:bodyPr rtlCol="0" anchor="ctr"/>
+          <a:lstStyle/>
+          <a:p>
+            <a:pPr algn="ctr"/>
+            <a:r>
+              <a:rPr lang="en-US" dirty="0">
+                <a:solidFill>
+                  <a:schemeClr val="tx1"/>
+                </a:solidFill>
+              </a:rPr>
+              <a:t>Module 1</a:t>
+            </a:r>
+          </a:p>
+        </p:txBody>
+      </p:sp>
+      <p:sp>
+        <p:nvSpPr>
+          <p:cNvPr id="16" name="TextBox 15">
+            <a:extLst>
+              <a:ext uri="{FF2B5EF4-FFF2-40B4-BE49-F238E27FC236}">
+                <a16:creationId xmlns:a16="http://schemas.microsoft.com/office/drawing/2014/main" id="{68B88394-E5AA-4BCE-AC3A-58A0029E8364}"/>
+              </a:ext>
+            </a:extLst>
+          </p:cNvPr>
+          <p:cNvSpPr txBox="1"/>
+          <p:nvPr/>
+        </p:nvSpPr>
+        <p:spPr>
+          <a:xfrm>
+            <a:off x="4717624" y="5145910"/>
+            <a:ext cx="2619078" cy="307777"/>
+          </a:xfrm>
+          <a:prstGeom prst="rect">
+            <a:avLst/>
+          </a:prstGeom>
+          <a:noFill/>
+        </p:spPr>
+        <p:txBody>
+          <a:bodyPr wrap="square" rtlCol="0">
+            <a:spAutoFit/>
+          </a:bodyPr>
+          <a:lstStyle/>
+          <a:p>
+            <a:r>
+              <a:rPr lang="en-US" sz="1400" dirty="0"/>
+              <a:t>Multi-round Owner </a:t>
+            </a:r>
+            <a:r>
+              <a:rPr lang="en-US" sz="1400" dirty="0" err="1"/>
+              <a:t>ServiceInfo</a:t>
+            </a:r>
+            <a:endParaRPr lang="en-US" sz="1400" dirty="0"/>
+          </a:p>
+        </p:txBody>
+      </p:sp>
+      <p:sp>
+        <p:nvSpPr>
+          <p:cNvPr id="17" name="Arrow: Up 16">
+            <a:extLst>
+              <a:ext uri="{FF2B5EF4-FFF2-40B4-BE49-F238E27FC236}">
+                <a16:creationId xmlns:a16="http://schemas.microsoft.com/office/drawing/2014/main" id="{CFE04B38-E988-468A-9EA0-518DBCD09B86}"/>
+              </a:ext>
+            </a:extLst>
+          </p:cNvPr>
+          <p:cNvSpPr/>
+          <p:nvPr/>
+        </p:nvSpPr>
+        <p:spPr>
+          <a:xfrm>
+            <a:off x="2931736" y="1971947"/>
+            <a:ext cx="122548" cy="2455949"/>
+          </a:xfrm>
+          <a:prstGeom prst="upArrow">
+            <a:avLst/>
+          </a:prstGeom>
+          <a:solidFill>
+            <a:schemeClr val="bg1"/>
+          </a:solidFill>
+        </p:spPr>
+        <p:style>
+          <a:lnRef idx="2">
+            <a:schemeClr val="accent1">
+              <a:shade val="50000"/>
+            </a:schemeClr>
+          </a:lnRef>
+          <a:fillRef idx="1">
+            <a:schemeClr val="accent1"/>
+          </a:fillRef>
+          <a:effectRef idx="0">
+            <a:schemeClr val="accent1"/>
+          </a:effectRef>
+          <a:fontRef idx="minor">
+            <a:schemeClr val="lt1"/>
+          </a:fontRef>
+        </p:style>
+        <p:txBody>
+          <a:bodyPr rtlCol="0" anchor="ctr"/>
+          <a:lstStyle/>
+          <a:p>
+            <a:pPr algn="ctr"/>
+            <a:endParaRPr lang="en-US"/>
+          </a:p>
+        </p:txBody>
+      </p:sp>
+      <p:sp>
+        <p:nvSpPr>
+          <p:cNvPr id="18" name="Arrow: Up 17">
+            <a:extLst>
+              <a:ext uri="{FF2B5EF4-FFF2-40B4-BE49-F238E27FC236}">
+                <a16:creationId xmlns:a16="http://schemas.microsoft.com/office/drawing/2014/main" id="{43622C0C-63C5-418F-99FD-A78A6A6B18EF}"/>
+              </a:ext>
+            </a:extLst>
+          </p:cNvPr>
+          <p:cNvSpPr/>
+          <p:nvPr/>
+        </p:nvSpPr>
+        <p:spPr>
+          <a:xfrm>
+            <a:off x="3751868" y="3424232"/>
+            <a:ext cx="122548" cy="1003664"/>
+          </a:xfrm>
+          <a:prstGeom prst="upArrow">
+            <a:avLst/>
+          </a:prstGeom>
+          <a:solidFill>
+            <a:schemeClr val="bg1"/>
+          </a:solidFill>
+        </p:spPr>
+        <p:style>
+          <a:lnRef idx="2">
+            <a:schemeClr val="accent1">
+              <a:shade val="50000"/>
+            </a:schemeClr>
+          </a:lnRef>
+          <a:fillRef idx="1">
+            <a:schemeClr val="accent1"/>
+          </a:fillRef>
+          <a:effectRef idx="0">
+            <a:schemeClr val="accent1"/>
+          </a:effectRef>
+          <a:fontRef idx="minor">
+            <a:schemeClr val="lt1"/>
+          </a:fontRef>
+        </p:style>
+        <p:txBody>
+          <a:bodyPr rtlCol="0" anchor="ctr"/>
+          <a:lstStyle/>
+          <a:p>
+            <a:pPr algn="ctr"/>
+            <a:endParaRPr lang="en-US"/>
+          </a:p>
+        </p:txBody>
+      </p:sp>
+      <p:sp>
+        <p:nvSpPr>
+          <p:cNvPr id="19" name="Arrow: Up 18">
+            <a:extLst>
+              <a:ext uri="{FF2B5EF4-FFF2-40B4-BE49-F238E27FC236}">
+                <a16:creationId xmlns:a16="http://schemas.microsoft.com/office/drawing/2014/main" id="{0F83DB9C-2F94-4325-810C-BD4266F0B759}"/>
+              </a:ext>
+            </a:extLst>
+          </p:cNvPr>
+          <p:cNvSpPr/>
+          <p:nvPr/>
+        </p:nvSpPr>
+        <p:spPr>
+          <a:xfrm>
+            <a:off x="8099197" y="3435227"/>
+            <a:ext cx="122548" cy="1003664"/>
+          </a:xfrm>
+          <a:prstGeom prst="upArrow">
+            <a:avLst/>
+          </a:prstGeom>
+          <a:solidFill>
+            <a:schemeClr val="bg1"/>
+          </a:solidFill>
+        </p:spPr>
+        <p:style>
+          <a:lnRef idx="2">
+            <a:schemeClr val="accent1">
+              <a:shade val="50000"/>
+            </a:schemeClr>
+          </a:lnRef>
+          <a:fillRef idx="1">
+            <a:schemeClr val="accent1"/>
+          </a:fillRef>
+          <a:effectRef idx="0">
+            <a:schemeClr val="accent1"/>
+          </a:effectRef>
+          <a:fontRef idx="minor">
+            <a:schemeClr val="lt1"/>
+          </a:fontRef>
+        </p:style>
+        <p:txBody>
+          <a:bodyPr rtlCol="0" anchor="ctr"/>
+          <a:lstStyle/>
+          <a:p>
+            <a:pPr algn="ctr"/>
+            <a:endParaRPr lang="en-US"/>
+          </a:p>
+        </p:txBody>
+      </p:sp>
+      <p:sp>
+        <p:nvSpPr>
+          <p:cNvPr id="20" name="Arrow: Up 19">
+            <a:extLst>
+              <a:ext uri="{FF2B5EF4-FFF2-40B4-BE49-F238E27FC236}">
+                <a16:creationId xmlns:a16="http://schemas.microsoft.com/office/drawing/2014/main" id="{07D2AD30-FD00-4EFF-9F9C-601C8BF6F41E}"/>
+              </a:ext>
+            </a:extLst>
+          </p:cNvPr>
+          <p:cNvSpPr/>
+          <p:nvPr/>
+        </p:nvSpPr>
+        <p:spPr>
+          <a:xfrm>
+            <a:off x="8711936" y="1982942"/>
+            <a:ext cx="122548" cy="2455949"/>
+          </a:xfrm>
+          <a:prstGeom prst="upArrow">
+            <a:avLst/>
+          </a:prstGeom>
+          <a:solidFill>
+            <a:schemeClr val="bg1"/>
+          </a:solidFill>
+        </p:spPr>
+        <p:style>
+          <a:lnRef idx="2">
+            <a:schemeClr val="accent1">
+              <a:shade val="50000"/>
+            </a:schemeClr>
+          </a:lnRef>
+          <a:fillRef idx="1">
+            <a:schemeClr val="accent1"/>
+          </a:fillRef>
+          <a:effectRef idx="0">
+            <a:schemeClr val="accent1"/>
+          </a:effectRef>
+          <a:fontRef idx="minor">
+            <a:schemeClr val="lt1"/>
+          </a:fontRef>
+        </p:style>
+        <p:txBody>
+          <a:bodyPr rtlCol="0" anchor="ctr"/>
+          <a:lstStyle/>
+          <a:p>
+            <a:pPr algn="ctr"/>
+            <a:endParaRPr lang="en-US"/>
+          </a:p>
+        </p:txBody>
+      </p:sp>
+      <p:sp>
+        <p:nvSpPr>
+          <p:cNvPr id="21" name="Arrow: Left-Right 20">
+            <a:extLst>
+              <a:ext uri="{FF2B5EF4-FFF2-40B4-BE49-F238E27FC236}">
+                <a16:creationId xmlns:a16="http://schemas.microsoft.com/office/drawing/2014/main" id="{B7C62152-5BBE-423D-984D-0E35C988F786}"/>
+              </a:ext>
+            </a:extLst>
+          </p:cNvPr>
+          <p:cNvSpPr/>
+          <p:nvPr/>
+        </p:nvSpPr>
+        <p:spPr>
+          <a:xfrm>
+            <a:off x="3582187" y="1566004"/>
+            <a:ext cx="4677259" cy="140248"/>
+          </a:xfrm>
+          <a:prstGeom prst="leftRightArrow">
+            <a:avLst/>
+          </a:prstGeom>
+          <a:solidFill>
+            <a:schemeClr val="bg1"/>
+          </a:solidFill>
+        </p:spPr>
+        <p:style>
+          <a:lnRef idx="2">
+            <a:schemeClr val="accent1">
+              <a:shade val="50000"/>
+            </a:schemeClr>
+          </a:lnRef>
+          <a:fillRef idx="1">
+            <a:schemeClr val="accent1"/>
+          </a:fillRef>
+          <a:effectRef idx="0">
+            <a:schemeClr val="accent1"/>
+          </a:effectRef>
+          <a:fontRef idx="minor">
+            <a:schemeClr val="lt1"/>
+          </a:fontRef>
+        </p:style>
+        <p:txBody>
+          <a:bodyPr rtlCol="0" anchor="ctr"/>
+          <a:lstStyle/>
+          <a:p>
+            <a:pPr algn="ctr"/>
+            <a:endParaRPr lang="en-US"/>
+          </a:p>
+        </p:txBody>
+      </p:sp>
+      <p:sp>
+        <p:nvSpPr>
+          <p:cNvPr id="22" name="Arrow: Left-Right 21">
+            <a:extLst>
+              <a:ext uri="{FF2B5EF4-FFF2-40B4-BE49-F238E27FC236}">
+                <a16:creationId xmlns:a16="http://schemas.microsoft.com/office/drawing/2014/main" id="{05F4BC47-4D9C-46C6-8DFD-5D2CE8C02E9A}"/>
+              </a:ext>
+            </a:extLst>
+          </p:cNvPr>
+          <p:cNvSpPr/>
+          <p:nvPr/>
+        </p:nvSpPr>
+        <p:spPr>
+          <a:xfrm>
+            <a:off x="4224784" y="3000449"/>
+            <a:ext cx="3460721" cy="161804"/>
+          </a:xfrm>
+          <a:prstGeom prst="leftRightArrow">
+            <a:avLst/>
+          </a:prstGeom>
+          <a:solidFill>
+            <a:schemeClr val="bg1"/>
+          </a:solidFill>
+        </p:spPr>
+        <p:style>
+          <a:lnRef idx="2">
+            <a:schemeClr val="accent1">
+              <a:shade val="50000"/>
+            </a:schemeClr>
+          </a:lnRef>
+          <a:fillRef idx="1">
+            <a:schemeClr val="accent1"/>
+          </a:fillRef>
+          <a:effectRef idx="0">
+            <a:schemeClr val="accent1"/>
+          </a:effectRef>
+          <a:fontRef idx="minor">
+            <a:schemeClr val="lt1"/>
+          </a:fontRef>
+        </p:style>
+        <p:txBody>
+          <a:bodyPr rtlCol="0" anchor="ctr"/>
+          <a:lstStyle/>
+          <a:p>
+            <a:pPr algn="ctr"/>
+            <a:endParaRPr lang="en-US"/>
+          </a:p>
+        </p:txBody>
+      </p:sp>
+      <p:sp>
+        <p:nvSpPr>
+          <p:cNvPr id="24" name="Arrow: Up-Down 23">
+            <a:extLst>
+              <a:ext uri="{FF2B5EF4-FFF2-40B4-BE49-F238E27FC236}">
+                <a16:creationId xmlns:a16="http://schemas.microsoft.com/office/drawing/2014/main" id="{8D20AE69-E099-418D-97A1-5C7D531B2CC0}"/>
+              </a:ext>
+            </a:extLst>
+          </p:cNvPr>
+          <p:cNvSpPr/>
+          <p:nvPr/>
+        </p:nvSpPr>
+        <p:spPr>
+          <a:xfrm>
+            <a:off x="1630836" y="3402676"/>
+            <a:ext cx="122548" cy="1046775"/>
+          </a:xfrm>
+          <a:prstGeom prst="upDownArrow">
+            <a:avLst/>
+          </a:prstGeom>
+          <a:solidFill>
+            <a:schemeClr val="bg1"/>
+          </a:solidFill>
+        </p:spPr>
+        <p:style>
+          <a:lnRef idx="2">
+            <a:schemeClr val="accent1">
+              <a:shade val="50000"/>
+            </a:schemeClr>
+          </a:lnRef>
+          <a:fillRef idx="1">
+            <a:schemeClr val="accent1"/>
+          </a:fillRef>
+          <a:effectRef idx="0">
+            <a:schemeClr val="accent1"/>
+          </a:effectRef>
+          <a:fontRef idx="minor">
+            <a:schemeClr val="lt1"/>
+          </a:fontRef>
+        </p:style>
+        <p:txBody>
+          <a:bodyPr rtlCol="0" anchor="ctr"/>
+          <a:lstStyle/>
+          <a:p>
+            <a:pPr algn="ctr"/>
+            <a:endParaRPr lang="en-US"/>
+          </a:p>
+        </p:txBody>
+      </p:sp>
+      <p:sp>
+        <p:nvSpPr>
+          <p:cNvPr id="26" name="TextBox 25">
+            <a:extLst>
+              <a:ext uri="{FF2B5EF4-FFF2-40B4-BE49-F238E27FC236}">
+                <a16:creationId xmlns:a16="http://schemas.microsoft.com/office/drawing/2014/main" id="{6BD3A747-DC32-4BC4-87B4-7FFA182E1A92}"/>
+              </a:ext>
+            </a:extLst>
+          </p:cNvPr>
+          <p:cNvSpPr txBox="1"/>
+          <p:nvPr/>
+        </p:nvSpPr>
+        <p:spPr>
+          <a:xfrm>
+            <a:off x="955728" y="3770721"/>
+            <a:ext cx="810707" cy="307777"/>
+          </a:xfrm>
+          <a:prstGeom prst="rect">
+            <a:avLst/>
+          </a:prstGeom>
+          <a:noFill/>
+        </p:spPr>
+        <p:txBody>
+          <a:bodyPr wrap="square" rtlCol="0">
+            <a:spAutoFit/>
+          </a:bodyPr>
+          <a:lstStyle/>
+          <a:p>
+            <a:r>
+              <a:rPr lang="en-US" sz="1400" dirty="0"/>
+              <a:t>SDK API</a:t>
+            </a:r>
+          </a:p>
+        </p:txBody>
+      </p:sp>
+      <p:sp>
+        <p:nvSpPr>
+          <p:cNvPr id="27" name="TextBox 26">
+            <a:extLst>
+              <a:ext uri="{FF2B5EF4-FFF2-40B4-BE49-F238E27FC236}">
+                <a16:creationId xmlns:a16="http://schemas.microsoft.com/office/drawing/2014/main" id="{0F4CF4A5-B964-479C-9236-905A030ED0F4}"/>
+              </a:ext>
+            </a:extLst>
+          </p:cNvPr>
+          <p:cNvSpPr txBox="1"/>
+          <p:nvPr/>
+        </p:nvSpPr>
+        <p:spPr>
+          <a:xfrm>
+            <a:off x="3059474" y="3772289"/>
+            <a:ext cx="810707" cy="523220"/>
+          </a:xfrm>
+          <a:prstGeom prst="rect">
+            <a:avLst/>
+          </a:prstGeom>
+          <a:noFill/>
+        </p:spPr>
+        <p:txBody>
+          <a:bodyPr wrap="square" rtlCol="0">
+            <a:spAutoFit/>
+          </a:bodyPr>
+          <a:lstStyle/>
+          <a:p>
+            <a:r>
+              <a:rPr lang="en-US" sz="1400" dirty="0"/>
+              <a:t>Module</a:t>
+            </a:r>
+          </a:p>
+          <a:p>
+            <a:r>
+              <a:rPr lang="en-US" sz="1400" dirty="0"/>
+              <a:t>callback</a:t>
+            </a:r>
+          </a:p>
+        </p:txBody>
+      </p:sp>
+      <p:sp>
+        <p:nvSpPr>
+          <p:cNvPr id="28" name="TextBox 27">
+            <a:extLst>
+              <a:ext uri="{FF2B5EF4-FFF2-40B4-BE49-F238E27FC236}">
+                <a16:creationId xmlns:a16="http://schemas.microsoft.com/office/drawing/2014/main" id="{BE14C1E6-1E49-43DA-820F-862EDFB36C63}"/>
+              </a:ext>
+            </a:extLst>
+          </p:cNvPr>
+          <p:cNvSpPr txBox="1"/>
+          <p:nvPr/>
+        </p:nvSpPr>
+        <p:spPr>
+          <a:xfrm>
+            <a:off x="3751867" y="1330748"/>
+            <a:ext cx="4347329" cy="307777"/>
+          </a:xfrm>
+          <a:prstGeom prst="rect">
+            <a:avLst/>
+          </a:prstGeom>
+          <a:noFill/>
+        </p:spPr>
+        <p:txBody>
+          <a:bodyPr wrap="square" rtlCol="0">
+            <a:spAutoFit/>
+          </a:bodyPr>
+          <a:lstStyle/>
+          <a:p>
+            <a:r>
+              <a:rPr lang="en-US" sz="1400" dirty="0"/>
+              <a:t>Multiple rounds of Device-to-Cloud and Cloud-to-Device</a:t>
+            </a:r>
+          </a:p>
+        </p:txBody>
+      </p:sp>
+      <p:sp>
+        <p:nvSpPr>
+          <p:cNvPr id="29" name="TextBox 28">
+            <a:extLst>
+              <a:ext uri="{FF2B5EF4-FFF2-40B4-BE49-F238E27FC236}">
+                <a16:creationId xmlns:a16="http://schemas.microsoft.com/office/drawing/2014/main" id="{67B2376F-95C5-4F8C-A45E-7549B1192BB8}"/>
+              </a:ext>
+            </a:extLst>
+          </p:cNvPr>
+          <p:cNvSpPr txBox="1"/>
+          <p:nvPr/>
+        </p:nvSpPr>
+        <p:spPr>
+          <a:xfrm>
+            <a:off x="4427455" y="2550937"/>
+            <a:ext cx="3055865" cy="523220"/>
+          </a:xfrm>
+          <a:prstGeom prst="rect">
+            <a:avLst/>
+          </a:prstGeom>
+          <a:noFill/>
+        </p:spPr>
+        <p:txBody>
+          <a:bodyPr wrap="square" rtlCol="0">
+            <a:spAutoFit/>
+          </a:bodyPr>
+          <a:lstStyle/>
+          <a:p>
+            <a:pPr algn="ctr"/>
+            <a:r>
+              <a:rPr lang="en-US" sz="1400" dirty="0"/>
+              <a:t>Multiple rounds of Device-to-Cloud and </a:t>
+            </a:r>
+          </a:p>
+          <a:p>
+            <a:pPr algn="ctr"/>
+            <a:r>
+              <a:rPr lang="en-US" sz="1400" dirty="0"/>
+              <a:t>Cloud-to-Device</a:t>
+            </a:r>
+          </a:p>
+        </p:txBody>
+      </p:sp>
+    </p:spTree>
+    <p:extLst>
+      <p:ext uri="{BB962C8B-B14F-4D97-AF65-F5344CB8AC3E}">
+        <p14:creationId xmlns:p14="http://schemas.microsoft.com/office/powerpoint/2010/main" val="504898964"/>
+      </p:ext>
+    </p:extLst>
+  </p:cSld>
+  <p:clrMapOvr>
+    <a:masterClrMapping/>
+  </p:clrMapOvr>
+</p:sld>
+</file>
+
+<file path=ppt/slides/slide9.xml><?xml version="1.0" encoding="utf-8"?>
+<p:sld xmlns:a="http://schemas.openxmlformats.org/drawingml/2006/main" xmlns:r="http://schemas.openxmlformats.org/officeDocument/2006/relationships" xmlns:p="http://schemas.openxmlformats.org/presentationml/2006/main">
+  <p:cSld>
+    <p:spTree>
+      <p:nvGrpSpPr>
+        <p:cNvPr id="1" name=""/>
+        <p:cNvGrpSpPr/>
+        <p:nvPr/>
+      </p:nvGrpSpPr>
+      <p:grpSpPr>
+        <a:xfrm>
+          <a:off x="0" y="0"/>
+          <a:ext cx="0" cy="0"/>
+          <a:chOff x="0" y="0"/>
+          <a:chExt cx="0" cy="0"/>
+        </a:xfrm>
+      </p:grpSpPr>
+      <p:pic>
+        <p:nvPicPr>
+          <p:cNvPr id="5" name="Picture 4" descr="A screenshot of a cell phone&#10;&#10;Description automatically generated">
+            <a:extLst>
+              <a:ext uri="{FF2B5EF4-FFF2-40B4-BE49-F238E27FC236}">
+                <a16:creationId xmlns:a16="http://schemas.microsoft.com/office/drawing/2014/main" id="{BC225A51-E9BD-46B1-9961-68EEC7C50CEE}"/>
+              </a:ext>
+            </a:extLst>
+          </p:cNvPr>
+          <p:cNvPicPr>
+            <a:picLocks noChangeAspect="1"/>
+          </p:cNvPicPr>
+          <p:nvPr/>
+        </p:nvPicPr>
+        <p:blipFill>
+          <a:blip r:embed="rId2">
+            <a:extLst>
+              <a:ext uri="{28A0092B-C50C-407E-A947-70E740481C1C}">
+                <a14:useLocalDpi xmlns:a14="http://schemas.microsoft.com/office/drawing/2010/main" val="0"/>
+              </a:ext>
+            </a:extLst>
+          </a:blip>
+          <a:stretch>
+            <a:fillRect/>
+          </a:stretch>
+        </p:blipFill>
+        <p:spPr>
+          <a:xfrm>
+            <a:off x="956310" y="289560"/>
+            <a:ext cx="10279380" cy="6278880"/>
+          </a:xfrm>
+          <a:prstGeom prst="rect">
+            <a:avLst/>
+          </a:prstGeom>
+        </p:spPr>
+      </p:pic>
+      <p:sp>
+        <p:nvSpPr>
+          <p:cNvPr id="6" name="TextBox 5">
+            <a:extLst>
+              <a:ext uri="{FF2B5EF4-FFF2-40B4-BE49-F238E27FC236}">
+                <a16:creationId xmlns:a16="http://schemas.microsoft.com/office/drawing/2014/main" id="{9D6B92AA-894C-467B-9B59-DDFD559726F7}"/>
+              </a:ext>
+            </a:extLst>
+          </p:cNvPr>
+          <p:cNvSpPr txBox="1"/>
+          <p:nvPr/>
+        </p:nvSpPr>
+        <p:spPr>
+          <a:xfrm>
+            <a:off x="8977745" y="2541321"/>
+            <a:ext cx="1696953" cy="1116280"/>
+          </a:xfrm>
+          <a:prstGeom prst="rect">
+            <a:avLst/>
+          </a:prstGeom>
+          <a:solidFill>
+            <a:schemeClr val="bg1"/>
+          </a:solidFill>
+          <a:ln>
+            <a:noFill/>
+          </a:ln>
+        </p:spPr>
+        <p:txBody>
+          <a:bodyPr wrap="none" rtlCol="0" anchor="ctr" anchorCtr="0">
+            <a:noAutofit/>
+          </a:bodyPr>
+          <a:lstStyle/>
+          <a:p>
+            <a:pPr algn="ctr"/>
+            <a:r>
+              <a:rPr lang="en-US" sz="2400" dirty="0"/>
+              <a:t>SDO</a:t>
+            </a:r>
+          </a:p>
+          <a:p>
+            <a:pPr algn="ctr"/>
+            <a:r>
+              <a:rPr lang="en-US" sz="2400" dirty="0"/>
+              <a:t>Client SDK</a:t>
+            </a:r>
+          </a:p>
+        </p:txBody>
+      </p:sp>
+      <p:sp>
+        <p:nvSpPr>
+          <p:cNvPr id="3" name="Rectangle 2">
+            <a:extLst>
+              <a:ext uri="{FF2B5EF4-FFF2-40B4-BE49-F238E27FC236}">
+                <a16:creationId xmlns:a16="http://schemas.microsoft.com/office/drawing/2014/main" id="{45C2AFF0-CD88-42EB-88CB-F6C4E349EB4C}"/>
+              </a:ext>
+            </a:extLst>
+          </p:cNvPr>
+          <p:cNvSpPr/>
+          <p:nvPr/>
+        </p:nvSpPr>
+        <p:spPr>
+          <a:xfrm>
+            <a:off x="8977745" y="2541321"/>
+            <a:ext cx="1696953" cy="1116280"/>
+          </a:xfrm>
+          <a:prstGeom prst="rect">
+            <a:avLst/>
+          </a:prstGeom>
+          <a:solidFill>
+            <a:schemeClr val="bg1"/>
+          </a:solidFill>
+          <a:ln>
+            <a:solidFill>
+              <a:schemeClr val="bg1"/>
+            </a:solidFill>
+          </a:ln>
+        </p:spPr>
+        <p:style>
+          <a:lnRef idx="2">
+            <a:schemeClr val="accent1">
+              <a:shade val="50000"/>
+            </a:schemeClr>
+          </a:lnRef>
+          <a:fillRef idx="1">
+            <a:schemeClr val="accent1"/>
+          </a:fillRef>
+          <a:effectRef idx="0">
+            <a:schemeClr val="accent1"/>
+          </a:effectRef>
+          <a:fontRef idx="minor">
+            <a:schemeClr val="lt1"/>
+          </a:fontRef>
+        </p:style>
+        <p:txBody>
+          <a:bodyPr rtlCol="0" anchor="ctr"/>
+          <a:lstStyle/>
+          <a:p>
+            <a:pPr algn="ctr"/>
+            <a:r>
+              <a:rPr lang="en-US" dirty="0">
+                <a:solidFill>
+                  <a:schemeClr val="tx1"/>
+                </a:solidFill>
+              </a:rPr>
+              <a:t>FDO</a:t>
+            </a:r>
+          </a:p>
+          <a:p>
+            <a:pPr algn="ctr"/>
+            <a:r>
+              <a:rPr lang="en-US" dirty="0">
+                <a:solidFill>
+                  <a:schemeClr val="tx1"/>
+                </a:solidFill>
+              </a:rPr>
+              <a:t>Client SDK</a:t>
+            </a:r>
+          </a:p>
+        </p:txBody>
+      </p:sp>
+    </p:spTree>
+    <p:extLst>
+      <p:ext uri="{BB962C8B-B14F-4D97-AF65-F5344CB8AC3E}">
+        <p14:creationId xmlns:p14="http://schemas.microsoft.com/office/powerpoint/2010/main" val="2306239405"/>
       </p:ext>
     </p:extLst>
   </p:cSld>
@@ -9989,6 +12018,15 @@
 </file>
 
 <file path=customXml/item1.xml><?xml version="1.0" encoding="utf-8"?>
+<?mso-contentType ?>
+<FormTemplates xmlns="http://schemas.microsoft.com/sharepoint/v3/contenttype/forms">
+  <Display>DocumentLibraryForm</Display>
+  <Edit>DocumentLibraryForm</Edit>
+  <New>DocumentLibraryForm</New>
+</FormTemplates>
+</file>
+
+<file path=customXml/item2.xml><?xml version="1.0" encoding="utf-8"?>
 <ct:contentTypeSchema xmlns:ct="http://schemas.microsoft.com/office/2006/metadata/contentType" xmlns:ma="http://schemas.microsoft.com/office/2006/metadata/properties/metaAttributes" ct:_="" ma:_="" ma:contentTypeName="Document" ma:contentTypeID="0x0101005E3F5E7557E766438161B45A0A61DC2E" ma:contentTypeVersion="13" ma:contentTypeDescription="Create a new document." ma:contentTypeScope="" ma:versionID="d1f0ee89402bac91d77c29cc9507da6a">
   <xsd:schema xmlns:xsd="http://www.w3.org/2001/XMLSchema" xmlns:xs="http://www.w3.org/2001/XMLSchema" xmlns:p="http://schemas.microsoft.com/office/2006/metadata/properties" xmlns:ns3="434a48cd-e876-4e7e-9231-cc5150ed5586" xmlns:ns4="03058a63-5a63-4987-8c81-e5bfe130bffa" targetNamespace="http://schemas.microsoft.com/office/2006/metadata/properties" ma:root="true" ma:fieldsID="df6e2f0f61d236998f808855083d151e" ns3:_="" ns4:_="">
     <xsd:import namespace="434a48cd-e876-4e7e-9231-cc5150ed5586"/>
@@ -10211,15 +12249,6 @@
 </ct:contentTypeSchema>
 </file>
 
-<file path=customXml/item2.xml><?xml version="1.0" encoding="utf-8"?>
-<?mso-contentType ?>
-<FormTemplates xmlns="http://schemas.microsoft.com/sharepoint/v3/contenttype/forms">
-  <Display>DocumentLibraryForm</Display>
-  <Edit>DocumentLibraryForm</Edit>
-  <New>DocumentLibraryForm</New>
-</FormTemplates>
-</file>
-
 <file path=customXml/item3.xml><?xml version="1.0" encoding="utf-8"?>
 <p:properties xmlns:p="http://schemas.microsoft.com/office/2006/metadata/properties" xmlns:xsi="http://www.w3.org/2001/XMLSchema-instance" xmlns:pc="http://schemas.microsoft.com/office/infopath/2007/PartnerControls">
   <documentManagement/>
@@ -10227,6 +12256,14 @@
 </file>
 
 <file path=customXml/itemProps1.xml><?xml version="1.0" encoding="utf-8"?>
+<ds:datastoreItem xmlns:ds="http://schemas.openxmlformats.org/officeDocument/2006/customXml" ds:itemID="{A24B478A-033F-4C30-A5BA-66788CCF7450}">
+  <ds:schemaRefs>
+    <ds:schemaRef ds:uri="http://schemas.microsoft.com/sharepoint/v3/contenttype/forms"/>
+  </ds:schemaRefs>
+</ds:datastoreItem>
+</file>
+
+<file path=customXml/itemProps2.xml><?xml version="1.0" encoding="utf-8"?>
 <ds:datastoreItem xmlns:ds="http://schemas.openxmlformats.org/officeDocument/2006/customXml" ds:itemID="{A4AFE36C-2C37-4CBC-AAB3-9AF16055274F}">
   <ds:schemaRefs>
     <ds:schemaRef ds:uri="http://schemas.microsoft.com/office/2006/metadata/contentType"/>
@@ -10245,14 +12282,6 @@
 </ds:datastoreItem>
 </file>
 
-<file path=customXml/itemProps2.xml><?xml version="1.0" encoding="utf-8"?>
-<ds:datastoreItem xmlns:ds="http://schemas.openxmlformats.org/officeDocument/2006/customXml" ds:itemID="{A24B478A-033F-4C30-A5BA-66788CCF7450}">
-  <ds:schemaRefs>
-    <ds:schemaRef ds:uri="http://schemas.microsoft.com/sharepoint/v3/contenttype/forms"/>
-  </ds:schemaRefs>
-</ds:datastoreItem>
-</file>
-
 <file path=customXml/itemProps3.xml><?xml version="1.0" encoding="utf-8"?>
 <ds:datastoreItem xmlns:ds="http://schemas.openxmlformats.org/officeDocument/2006/customXml" ds:itemID="{EE153CBC-D450-4CB5-8089-CE99DEC4EF5B}">
   <ds:schemaRefs>

</xml_diff>